<commit_message>
Ling - slides 8-13
</commit_message>
<xml_diff>
--- a/Assignment2_Slides_LingVersion.pptx
+++ b/Assignment2_Slides_LingVersion.pptx
@@ -4,6 +4,9 @@
   <p:sldMasterIdLst>
     <p:sldMasterId id="2147483648" r:id="rId1"/>
   </p:sldMasterIdLst>
+  <p:notesMasterIdLst>
+    <p:notesMasterId r:id="rId17"/>
+  </p:notesMasterIdLst>
   <p:sldIdLst>
     <p:sldId id="15090155" r:id="rId2"/>
     <p:sldId id="15090158" r:id="rId3"/>
@@ -13,11 +16,13 @@
     <p:sldId id="15090159" r:id="rId7"/>
     <p:sldId id="15090176" r:id="rId8"/>
     <p:sldId id="15090177" r:id="rId9"/>
-    <p:sldId id="15090178" r:id="rId10"/>
-    <p:sldId id="15090179" r:id="rId11"/>
-    <p:sldId id="15090180" r:id="rId12"/>
-    <p:sldId id="15090175" r:id="rId13"/>
-    <p:sldId id="8829243" r:id="rId14"/>
+    <p:sldId id="15090181" r:id="rId10"/>
+    <p:sldId id="15090178" r:id="rId11"/>
+    <p:sldId id="15090183" r:id="rId12"/>
+    <p:sldId id="15090184" r:id="rId13"/>
+    <p:sldId id="15090182" r:id="rId14"/>
+    <p:sldId id="15090175" r:id="rId15"/>
+    <p:sldId id="8829243" r:id="rId16"/>
   </p:sldIdLst>
   <p:sldSz cx="9144000" cy="6858000" type="screen4x3"/>
   <p:notesSz cx="6858000" cy="9144000"/>
@@ -122,6 +127,608 @@
     </p:ext>
   </p:extLst>
 </p:presentation>
+</file>
+
+<file path=ppt/notesMasters/notesMaster1.xml><?xml version="1.0" encoding="utf-8"?>
+<p:notesMaster xmlns:a="http://schemas.openxmlformats.org/drawingml/2006/main" xmlns:r="http://schemas.openxmlformats.org/officeDocument/2006/relationships" xmlns:p="http://schemas.openxmlformats.org/presentationml/2006/main">
+  <p:cSld>
+    <p:bg>
+      <p:bgRef idx="1001">
+        <a:schemeClr val="bg1"/>
+      </p:bgRef>
+    </p:bg>
+    <p:spTree>
+      <p:nvGrpSpPr>
+        <p:cNvPr id="1" name=""/>
+        <p:cNvGrpSpPr/>
+        <p:nvPr/>
+      </p:nvGrpSpPr>
+      <p:grpSpPr>
+        <a:xfrm>
+          <a:off x="0" y="0"/>
+          <a:ext cx="0" cy="0"/>
+          <a:chOff x="0" y="0"/>
+          <a:chExt cx="0" cy="0"/>
+        </a:xfrm>
+      </p:grpSpPr>
+      <p:sp>
+        <p:nvSpPr>
+          <p:cNvPr id="2" name="Header Placeholder 1"/>
+          <p:cNvSpPr>
+            <a:spLocks noGrp="1"/>
+          </p:cNvSpPr>
+          <p:nvPr>
+            <p:ph type="hdr" sz="quarter"/>
+          </p:nvPr>
+        </p:nvSpPr>
+        <p:spPr>
+          <a:xfrm>
+            <a:off x="0" y="0"/>
+            <a:ext cx="2971800" cy="458788"/>
+          </a:xfrm>
+          <a:prstGeom prst="rect">
+            <a:avLst/>
+          </a:prstGeom>
+        </p:spPr>
+        <p:txBody>
+          <a:bodyPr vert="horz" lIns="91440" tIns="45720" rIns="91440" bIns="45720" rtlCol="0"/>
+          <a:lstStyle>
+            <a:lvl1pPr algn="l">
+              <a:defRPr sz="1200"/>
+            </a:lvl1pPr>
+          </a:lstStyle>
+          <a:p>
+            <a:endParaRPr lang="en-AU"/>
+          </a:p>
+        </p:txBody>
+      </p:sp>
+      <p:sp>
+        <p:nvSpPr>
+          <p:cNvPr id="3" name="Date Placeholder 2"/>
+          <p:cNvSpPr>
+            <a:spLocks noGrp="1"/>
+          </p:cNvSpPr>
+          <p:nvPr>
+            <p:ph type="dt" idx="1"/>
+          </p:nvPr>
+        </p:nvSpPr>
+        <p:spPr>
+          <a:xfrm>
+            <a:off x="3884613" y="0"/>
+            <a:ext cx="2971800" cy="458788"/>
+          </a:xfrm>
+          <a:prstGeom prst="rect">
+            <a:avLst/>
+          </a:prstGeom>
+        </p:spPr>
+        <p:txBody>
+          <a:bodyPr vert="horz" lIns="91440" tIns="45720" rIns="91440" bIns="45720" rtlCol="0"/>
+          <a:lstStyle>
+            <a:lvl1pPr algn="r">
+              <a:defRPr sz="1200"/>
+            </a:lvl1pPr>
+          </a:lstStyle>
+          <a:p>
+            <a:fld id="{FFC794F4-13A4-4C57-977C-3F68AC117E43}" type="datetimeFigureOut">
+              <a:rPr lang="en-AU" smtClean="0"/>
+              <a:t>30/10/2017</a:t>
+            </a:fld>
+            <a:endParaRPr lang="en-AU"/>
+          </a:p>
+        </p:txBody>
+      </p:sp>
+      <p:sp>
+        <p:nvSpPr>
+          <p:cNvPr id="4" name="Slide Image Placeholder 3"/>
+          <p:cNvSpPr>
+            <a:spLocks noGrp="1" noRot="1" noChangeAspect="1"/>
+          </p:cNvSpPr>
+          <p:nvPr>
+            <p:ph type="sldImg" idx="2"/>
+          </p:nvPr>
+        </p:nvSpPr>
+        <p:spPr>
+          <a:xfrm>
+            <a:off x="1371600" y="1143000"/>
+            <a:ext cx="4114800" cy="3086100"/>
+          </a:xfrm>
+          <a:prstGeom prst="rect">
+            <a:avLst/>
+          </a:prstGeom>
+          <a:noFill/>
+          <a:ln w="12700">
+            <a:solidFill>
+              <a:prstClr val="black"/>
+            </a:solidFill>
+          </a:ln>
+        </p:spPr>
+        <p:txBody>
+          <a:bodyPr vert="horz" lIns="91440" tIns="45720" rIns="91440" bIns="45720" rtlCol="0" anchor="ctr"/>
+          <a:lstStyle/>
+          <a:p>
+            <a:endParaRPr lang="en-AU"/>
+          </a:p>
+        </p:txBody>
+      </p:sp>
+      <p:sp>
+        <p:nvSpPr>
+          <p:cNvPr id="5" name="Notes Placeholder 4"/>
+          <p:cNvSpPr>
+            <a:spLocks noGrp="1"/>
+          </p:cNvSpPr>
+          <p:nvPr>
+            <p:ph type="body" sz="quarter" idx="3"/>
+          </p:nvPr>
+        </p:nvSpPr>
+        <p:spPr>
+          <a:xfrm>
+            <a:off x="685800" y="4400550"/>
+            <a:ext cx="5486400" cy="3600450"/>
+          </a:xfrm>
+          <a:prstGeom prst="rect">
+            <a:avLst/>
+          </a:prstGeom>
+        </p:spPr>
+        <p:txBody>
+          <a:bodyPr vert="horz" lIns="91440" tIns="45720" rIns="91440" bIns="45720" rtlCol="0"/>
+          <a:lstStyle/>
+          <a:p>
+            <a:pPr lvl="0"/>
+            <a:r>
+              <a:rPr lang="en-US" smtClean="0"/>
+              <a:t>Click to edit Master text styles</a:t>
+            </a:r>
+          </a:p>
+          <a:p>
+            <a:pPr lvl="1"/>
+            <a:r>
+              <a:rPr lang="en-US" smtClean="0"/>
+              <a:t>Second level</a:t>
+            </a:r>
+          </a:p>
+          <a:p>
+            <a:pPr lvl="2"/>
+            <a:r>
+              <a:rPr lang="en-US" smtClean="0"/>
+              <a:t>Third level</a:t>
+            </a:r>
+          </a:p>
+          <a:p>
+            <a:pPr lvl="3"/>
+            <a:r>
+              <a:rPr lang="en-US" smtClean="0"/>
+              <a:t>Fourth level</a:t>
+            </a:r>
+          </a:p>
+          <a:p>
+            <a:pPr lvl="4"/>
+            <a:r>
+              <a:rPr lang="en-US" smtClean="0"/>
+              <a:t>Fifth level</a:t>
+            </a:r>
+            <a:endParaRPr lang="en-AU"/>
+          </a:p>
+        </p:txBody>
+      </p:sp>
+      <p:sp>
+        <p:nvSpPr>
+          <p:cNvPr id="6" name="Footer Placeholder 5"/>
+          <p:cNvSpPr>
+            <a:spLocks noGrp="1"/>
+          </p:cNvSpPr>
+          <p:nvPr>
+            <p:ph type="ftr" sz="quarter" idx="4"/>
+          </p:nvPr>
+        </p:nvSpPr>
+        <p:spPr>
+          <a:xfrm>
+            <a:off x="0" y="8685213"/>
+            <a:ext cx="2971800" cy="458787"/>
+          </a:xfrm>
+          <a:prstGeom prst="rect">
+            <a:avLst/>
+          </a:prstGeom>
+        </p:spPr>
+        <p:txBody>
+          <a:bodyPr vert="horz" lIns="91440" tIns="45720" rIns="91440" bIns="45720" rtlCol="0" anchor="b"/>
+          <a:lstStyle>
+            <a:lvl1pPr algn="l">
+              <a:defRPr sz="1200"/>
+            </a:lvl1pPr>
+          </a:lstStyle>
+          <a:p>
+            <a:endParaRPr lang="en-AU"/>
+          </a:p>
+        </p:txBody>
+      </p:sp>
+      <p:sp>
+        <p:nvSpPr>
+          <p:cNvPr id="7" name="Slide Number Placeholder 6"/>
+          <p:cNvSpPr>
+            <a:spLocks noGrp="1"/>
+          </p:cNvSpPr>
+          <p:nvPr>
+            <p:ph type="sldNum" sz="quarter" idx="5"/>
+          </p:nvPr>
+        </p:nvSpPr>
+        <p:spPr>
+          <a:xfrm>
+            <a:off x="3884613" y="8685213"/>
+            <a:ext cx="2971800" cy="458787"/>
+          </a:xfrm>
+          <a:prstGeom prst="rect">
+            <a:avLst/>
+          </a:prstGeom>
+        </p:spPr>
+        <p:txBody>
+          <a:bodyPr vert="horz" lIns="91440" tIns="45720" rIns="91440" bIns="45720" rtlCol="0" anchor="b"/>
+          <a:lstStyle>
+            <a:lvl1pPr algn="r">
+              <a:defRPr sz="1200"/>
+            </a:lvl1pPr>
+          </a:lstStyle>
+          <a:p>
+            <a:fld id="{E0BCE117-F73A-4E09-80A5-18716F57A973}" type="slidenum">
+              <a:rPr lang="en-AU" smtClean="0"/>
+              <a:t>‹#›</a:t>
+            </a:fld>
+            <a:endParaRPr lang="en-AU"/>
+          </a:p>
+        </p:txBody>
+      </p:sp>
+    </p:spTree>
+    <p:extLst>
+      <p:ext uri="{BB962C8B-B14F-4D97-AF65-F5344CB8AC3E}">
+        <p14:creationId xmlns:p14="http://schemas.microsoft.com/office/powerpoint/2010/main" val="3403763758"/>
+      </p:ext>
+    </p:extLst>
+  </p:cSld>
+  <p:clrMap bg1="lt1" tx1="dk1" bg2="lt2" tx2="dk2" accent1="accent1" accent2="accent2" accent3="accent3" accent4="accent4" accent5="accent5" accent6="accent6" hlink="hlink" folHlink="folHlink"/>
+  <p:notesStyle>
+    <a:lvl1pPr marL="0" algn="l" defTabSz="914400" rtl="0" eaLnBrk="1" latinLnBrk="0" hangingPunct="1">
+      <a:defRPr sz="1200" kern="1200">
+        <a:solidFill>
+          <a:schemeClr val="tx1"/>
+        </a:solidFill>
+        <a:latin typeface="+mn-lt"/>
+        <a:ea typeface="+mn-ea"/>
+        <a:cs typeface="+mn-cs"/>
+      </a:defRPr>
+    </a:lvl1pPr>
+    <a:lvl2pPr marL="457200" algn="l" defTabSz="914400" rtl="0" eaLnBrk="1" latinLnBrk="0" hangingPunct="1">
+      <a:defRPr sz="1200" kern="1200">
+        <a:solidFill>
+          <a:schemeClr val="tx1"/>
+        </a:solidFill>
+        <a:latin typeface="+mn-lt"/>
+        <a:ea typeface="+mn-ea"/>
+        <a:cs typeface="+mn-cs"/>
+      </a:defRPr>
+    </a:lvl2pPr>
+    <a:lvl3pPr marL="914400" algn="l" defTabSz="914400" rtl="0" eaLnBrk="1" latinLnBrk="0" hangingPunct="1">
+      <a:defRPr sz="1200" kern="1200">
+        <a:solidFill>
+          <a:schemeClr val="tx1"/>
+        </a:solidFill>
+        <a:latin typeface="+mn-lt"/>
+        <a:ea typeface="+mn-ea"/>
+        <a:cs typeface="+mn-cs"/>
+      </a:defRPr>
+    </a:lvl3pPr>
+    <a:lvl4pPr marL="1371600" algn="l" defTabSz="914400" rtl="0" eaLnBrk="1" latinLnBrk="0" hangingPunct="1">
+      <a:defRPr sz="1200" kern="1200">
+        <a:solidFill>
+          <a:schemeClr val="tx1"/>
+        </a:solidFill>
+        <a:latin typeface="+mn-lt"/>
+        <a:ea typeface="+mn-ea"/>
+        <a:cs typeface="+mn-cs"/>
+      </a:defRPr>
+    </a:lvl4pPr>
+    <a:lvl5pPr marL="1828800" algn="l" defTabSz="914400" rtl="0" eaLnBrk="1" latinLnBrk="0" hangingPunct="1">
+      <a:defRPr sz="1200" kern="1200">
+        <a:solidFill>
+          <a:schemeClr val="tx1"/>
+        </a:solidFill>
+        <a:latin typeface="+mn-lt"/>
+        <a:ea typeface="+mn-ea"/>
+        <a:cs typeface="+mn-cs"/>
+      </a:defRPr>
+    </a:lvl5pPr>
+    <a:lvl6pPr marL="2286000" algn="l" defTabSz="914400" rtl="0" eaLnBrk="1" latinLnBrk="0" hangingPunct="1">
+      <a:defRPr sz="1200" kern="1200">
+        <a:solidFill>
+          <a:schemeClr val="tx1"/>
+        </a:solidFill>
+        <a:latin typeface="+mn-lt"/>
+        <a:ea typeface="+mn-ea"/>
+        <a:cs typeface="+mn-cs"/>
+      </a:defRPr>
+    </a:lvl6pPr>
+    <a:lvl7pPr marL="2743200" algn="l" defTabSz="914400" rtl="0" eaLnBrk="1" latinLnBrk="0" hangingPunct="1">
+      <a:defRPr sz="1200" kern="1200">
+        <a:solidFill>
+          <a:schemeClr val="tx1"/>
+        </a:solidFill>
+        <a:latin typeface="+mn-lt"/>
+        <a:ea typeface="+mn-ea"/>
+        <a:cs typeface="+mn-cs"/>
+      </a:defRPr>
+    </a:lvl7pPr>
+    <a:lvl8pPr marL="3200400" algn="l" defTabSz="914400" rtl="0" eaLnBrk="1" latinLnBrk="0" hangingPunct="1">
+      <a:defRPr sz="1200" kern="1200">
+        <a:solidFill>
+          <a:schemeClr val="tx1"/>
+        </a:solidFill>
+        <a:latin typeface="+mn-lt"/>
+        <a:ea typeface="+mn-ea"/>
+        <a:cs typeface="+mn-cs"/>
+      </a:defRPr>
+    </a:lvl8pPr>
+    <a:lvl9pPr marL="3657600" algn="l" defTabSz="914400" rtl="0" eaLnBrk="1" latinLnBrk="0" hangingPunct="1">
+      <a:defRPr sz="1200" kern="1200">
+        <a:solidFill>
+          <a:schemeClr val="tx1"/>
+        </a:solidFill>
+        <a:latin typeface="+mn-lt"/>
+        <a:ea typeface="+mn-ea"/>
+        <a:cs typeface="+mn-cs"/>
+      </a:defRPr>
+    </a:lvl9pPr>
+  </p:notesStyle>
+</p:notesMaster>
+</file>
+
+<file path=ppt/notesSlides/notesSlide1.xml><?xml version="1.0" encoding="utf-8"?>
+<p:notes xmlns:a="http://schemas.openxmlformats.org/drawingml/2006/main" xmlns:r="http://schemas.openxmlformats.org/officeDocument/2006/relationships" xmlns:p="http://schemas.openxmlformats.org/presentationml/2006/main">
+  <p:cSld>
+    <p:spTree>
+      <p:nvGrpSpPr>
+        <p:cNvPr id="1" name=""/>
+        <p:cNvGrpSpPr/>
+        <p:nvPr/>
+      </p:nvGrpSpPr>
+      <p:grpSpPr>
+        <a:xfrm>
+          <a:off x="0" y="0"/>
+          <a:ext cx="0" cy="0"/>
+          <a:chOff x="0" y="0"/>
+          <a:chExt cx="0" cy="0"/>
+        </a:xfrm>
+      </p:grpSpPr>
+      <p:sp>
+        <p:nvSpPr>
+          <p:cNvPr id="2" name="Slide Image Placeholder 1"/>
+          <p:cNvSpPr>
+            <a:spLocks noGrp="1" noRot="1" noChangeAspect="1"/>
+          </p:cNvSpPr>
+          <p:nvPr>
+            <p:ph type="sldImg"/>
+          </p:nvPr>
+        </p:nvSpPr>
+        <p:spPr/>
+      </p:sp>
+      <p:sp>
+        <p:nvSpPr>
+          <p:cNvPr id="3" name="Notes Placeholder 2"/>
+          <p:cNvSpPr>
+            <a:spLocks noGrp="1"/>
+          </p:cNvSpPr>
+          <p:nvPr>
+            <p:ph type="body" idx="1"/>
+          </p:nvPr>
+        </p:nvSpPr>
+        <p:spPr/>
+        <p:txBody>
+          <a:bodyPr/>
+          <a:lstStyle/>
+          <a:p>
+            <a:endParaRPr lang="en-AU" dirty="0"/>
+          </a:p>
+        </p:txBody>
+      </p:sp>
+      <p:sp>
+        <p:nvSpPr>
+          <p:cNvPr id="4" name="Slide Number Placeholder 3"/>
+          <p:cNvSpPr>
+            <a:spLocks noGrp="1"/>
+          </p:cNvSpPr>
+          <p:nvPr>
+            <p:ph type="sldNum" sz="quarter" idx="10"/>
+          </p:nvPr>
+        </p:nvSpPr>
+        <p:spPr/>
+        <p:txBody>
+          <a:bodyPr/>
+          <a:lstStyle/>
+          <a:p>
+            <a:fld id="{E0BCE117-F73A-4E09-80A5-18716F57A973}" type="slidenum">
+              <a:rPr lang="en-AU" smtClean="0"/>
+              <a:t>10</a:t>
+            </a:fld>
+            <a:endParaRPr lang="en-AU"/>
+          </a:p>
+        </p:txBody>
+      </p:sp>
+    </p:spTree>
+    <p:extLst>
+      <p:ext uri="{BB962C8B-B14F-4D97-AF65-F5344CB8AC3E}">
+        <p14:creationId xmlns:p14="http://schemas.microsoft.com/office/powerpoint/2010/main" val="3243346334"/>
+      </p:ext>
+    </p:extLst>
+  </p:cSld>
+  <p:clrMapOvr>
+    <a:masterClrMapping/>
+  </p:clrMapOvr>
+</p:notes>
+</file>
+
+<file path=ppt/notesSlides/notesSlide2.xml><?xml version="1.0" encoding="utf-8"?>
+<p:notes xmlns:a="http://schemas.openxmlformats.org/drawingml/2006/main" xmlns:r="http://schemas.openxmlformats.org/officeDocument/2006/relationships" xmlns:p="http://schemas.openxmlformats.org/presentationml/2006/main">
+  <p:cSld>
+    <p:spTree>
+      <p:nvGrpSpPr>
+        <p:cNvPr id="1" name=""/>
+        <p:cNvGrpSpPr/>
+        <p:nvPr/>
+      </p:nvGrpSpPr>
+      <p:grpSpPr>
+        <a:xfrm>
+          <a:off x="0" y="0"/>
+          <a:ext cx="0" cy="0"/>
+          <a:chOff x="0" y="0"/>
+          <a:chExt cx="0" cy="0"/>
+        </a:xfrm>
+      </p:grpSpPr>
+      <p:sp>
+        <p:nvSpPr>
+          <p:cNvPr id="2" name="Slide Image Placeholder 1"/>
+          <p:cNvSpPr>
+            <a:spLocks noGrp="1" noRot="1" noChangeAspect="1"/>
+          </p:cNvSpPr>
+          <p:nvPr>
+            <p:ph type="sldImg"/>
+          </p:nvPr>
+        </p:nvSpPr>
+        <p:spPr/>
+      </p:sp>
+      <p:sp>
+        <p:nvSpPr>
+          <p:cNvPr id="3" name="Notes Placeholder 2"/>
+          <p:cNvSpPr>
+            <a:spLocks noGrp="1"/>
+          </p:cNvSpPr>
+          <p:nvPr>
+            <p:ph type="body" idx="1"/>
+          </p:nvPr>
+        </p:nvSpPr>
+        <p:spPr/>
+        <p:txBody>
+          <a:bodyPr/>
+          <a:lstStyle/>
+          <a:p>
+            <a:endParaRPr lang="en-AU" dirty="0"/>
+          </a:p>
+        </p:txBody>
+      </p:sp>
+      <p:sp>
+        <p:nvSpPr>
+          <p:cNvPr id="4" name="Slide Number Placeholder 3"/>
+          <p:cNvSpPr>
+            <a:spLocks noGrp="1"/>
+          </p:cNvSpPr>
+          <p:nvPr>
+            <p:ph type="sldNum" sz="quarter" idx="10"/>
+          </p:nvPr>
+        </p:nvSpPr>
+        <p:spPr/>
+        <p:txBody>
+          <a:bodyPr/>
+          <a:lstStyle/>
+          <a:p>
+            <a:fld id="{E0BCE117-F73A-4E09-80A5-18716F57A973}" type="slidenum">
+              <a:rPr lang="en-AU" smtClean="0"/>
+              <a:t>11</a:t>
+            </a:fld>
+            <a:endParaRPr lang="en-AU"/>
+          </a:p>
+        </p:txBody>
+      </p:sp>
+    </p:spTree>
+    <p:extLst>
+      <p:ext uri="{BB962C8B-B14F-4D97-AF65-F5344CB8AC3E}">
+        <p14:creationId xmlns:p14="http://schemas.microsoft.com/office/powerpoint/2010/main" val="26060203"/>
+      </p:ext>
+    </p:extLst>
+  </p:cSld>
+  <p:clrMapOvr>
+    <a:masterClrMapping/>
+  </p:clrMapOvr>
+</p:notes>
+</file>
+
+<file path=ppt/notesSlides/notesSlide3.xml><?xml version="1.0" encoding="utf-8"?>
+<p:notes xmlns:a="http://schemas.openxmlformats.org/drawingml/2006/main" xmlns:r="http://schemas.openxmlformats.org/officeDocument/2006/relationships" xmlns:p="http://schemas.openxmlformats.org/presentationml/2006/main">
+  <p:cSld>
+    <p:spTree>
+      <p:nvGrpSpPr>
+        <p:cNvPr id="1" name=""/>
+        <p:cNvGrpSpPr/>
+        <p:nvPr/>
+      </p:nvGrpSpPr>
+      <p:grpSpPr>
+        <a:xfrm>
+          <a:off x="0" y="0"/>
+          <a:ext cx="0" cy="0"/>
+          <a:chOff x="0" y="0"/>
+          <a:chExt cx="0" cy="0"/>
+        </a:xfrm>
+      </p:grpSpPr>
+      <p:sp>
+        <p:nvSpPr>
+          <p:cNvPr id="2" name="Slide Image Placeholder 1"/>
+          <p:cNvSpPr>
+            <a:spLocks noGrp="1" noRot="1" noChangeAspect="1"/>
+          </p:cNvSpPr>
+          <p:nvPr>
+            <p:ph type="sldImg"/>
+          </p:nvPr>
+        </p:nvSpPr>
+        <p:spPr/>
+      </p:sp>
+      <p:sp>
+        <p:nvSpPr>
+          <p:cNvPr id="3" name="Notes Placeholder 2"/>
+          <p:cNvSpPr>
+            <a:spLocks noGrp="1"/>
+          </p:cNvSpPr>
+          <p:nvPr>
+            <p:ph type="body" idx="1"/>
+          </p:nvPr>
+        </p:nvSpPr>
+        <p:spPr/>
+        <p:txBody>
+          <a:bodyPr/>
+          <a:lstStyle/>
+          <a:p>
+            <a:endParaRPr lang="en-AU" dirty="0"/>
+          </a:p>
+        </p:txBody>
+      </p:sp>
+      <p:sp>
+        <p:nvSpPr>
+          <p:cNvPr id="4" name="Slide Number Placeholder 3"/>
+          <p:cNvSpPr>
+            <a:spLocks noGrp="1"/>
+          </p:cNvSpPr>
+          <p:nvPr>
+            <p:ph type="sldNum" sz="quarter" idx="10"/>
+          </p:nvPr>
+        </p:nvSpPr>
+        <p:spPr/>
+        <p:txBody>
+          <a:bodyPr/>
+          <a:lstStyle/>
+          <a:p>
+            <a:fld id="{E0BCE117-F73A-4E09-80A5-18716F57A973}" type="slidenum">
+              <a:rPr lang="en-AU" smtClean="0"/>
+              <a:t>12</a:t>
+            </a:fld>
+            <a:endParaRPr lang="en-AU"/>
+          </a:p>
+        </p:txBody>
+      </p:sp>
+    </p:spTree>
+    <p:extLst>
+      <p:ext uri="{BB962C8B-B14F-4D97-AF65-F5344CB8AC3E}">
+        <p14:creationId xmlns:p14="http://schemas.microsoft.com/office/powerpoint/2010/main" val="3197451397"/>
+      </p:ext>
+    </p:extLst>
+  </p:cSld>
+  <p:clrMapOvr>
+    <a:masterClrMapping/>
+  </p:clrMapOvr>
+</p:notes>
 </file>
 
 <file path=ppt/slideLayouts/slideLayout1.xml><?xml version="1.0" encoding="utf-8"?>
@@ -1282,7 +1889,7 @@
           <p:nvPr/>
         </p:nvPicPr>
         <p:blipFill>
-          <a:blip r:embed="rId2">
+          <a:blip r:embed="rId3">
             <a:extLst>
               <a:ext uri="{28A0092B-C50C-407E-A947-70E740481C1C}">
                 <a14:useLocalDpi xmlns:a14="http://schemas.microsoft.com/office/drawing/2010/main" val="0"/>
@@ -1311,8 +1918,8 @@
         </p:nvSpPr>
         <p:spPr>
           <a:xfrm>
-            <a:off x="4880009" y="257937"/>
-            <a:ext cx="4109988" cy="461665"/>
+            <a:off x="4263992" y="257937"/>
+            <a:ext cx="4726005" cy="461665"/>
           </a:xfrm>
           <a:prstGeom prst="rect">
             <a:avLst/>
@@ -1326,7 +1933,7 @@
           <a:lstStyle/>
           <a:p>
             <a:r>
-              <a:rPr lang="en-US" altLang="zh-CN" sz="2400" b="1" dirty="0" smtClean="0">
+              <a:rPr lang="en-AU" altLang="zh-CN" sz="2400" b="1" dirty="0" smtClean="0">
                 <a:solidFill>
                   <a:schemeClr val="bg1">
                     <a:lumMod val="95000"/>
@@ -1334,7 +1941,7 @@
                 </a:solidFill>
                 <a:latin typeface="Humnst777 Blk BT" panose="020B0803030504030204" pitchFamily="34" charset="0"/>
               </a:rPr>
-              <a:t>Delta analysis: 2016 - 2017 </a:t>
+              <a:t>Benchmarking and Evaluation</a:t>
             </a:r>
             <a:endParaRPr lang="zh-CN" altLang="en-US" sz="2400" b="1" dirty="0">
               <a:solidFill>
@@ -1373,6 +1980,70 @@
           </a:p>
         </p:txBody>
       </p:sp>
+      <p:sp>
+        <p:nvSpPr>
+          <p:cNvPr id="4" name="TextBox 3"/>
+          <p:cNvSpPr txBox="1"/>
+          <p:nvPr/>
+        </p:nvSpPr>
+        <p:spPr>
+          <a:xfrm>
+            <a:off x="455086" y="1275371"/>
+            <a:ext cx="8019820" cy="646331"/>
+          </a:xfrm>
+          <a:prstGeom prst="rect">
+            <a:avLst/>
+          </a:prstGeom>
+          <a:noFill/>
+        </p:spPr>
+        <p:txBody>
+          <a:bodyPr wrap="square" rtlCol="0">
+            <a:spAutoFit/>
+          </a:bodyPr>
+          <a:lstStyle/>
+          <a:p>
+            <a:r>
+              <a:rPr lang="en-AU" dirty="0" smtClean="0"/>
+              <a:t>This flow chart illustrates the process we undertook to benchmark 2016 versus 2017</a:t>
+            </a:r>
+          </a:p>
+          <a:p>
+            <a:r>
+              <a:rPr lang="en-AU" dirty="0"/>
+              <a:t> </a:t>
+            </a:r>
+            <a:r>
+              <a:rPr lang="en-AU" dirty="0" smtClean="0"/>
+              <a:t>                                                            prediction results </a:t>
+            </a:r>
+            <a:endParaRPr lang="en-AU" dirty="0"/>
+          </a:p>
+        </p:txBody>
+      </p:sp>
+      <p:pic>
+        <p:nvPicPr>
+          <p:cNvPr id="5" name="Picture 4"/>
+          <p:cNvPicPr>
+            <a:picLocks noChangeAspect="1"/>
+          </p:cNvPicPr>
+          <p:nvPr/>
+        </p:nvPicPr>
+        <p:blipFill>
+          <a:blip r:embed="rId4"/>
+          <a:stretch>
+            <a:fillRect/>
+          </a:stretch>
+        </p:blipFill>
+        <p:spPr>
+          <a:xfrm>
+            <a:off x="455086" y="2402517"/>
+            <a:ext cx="7892022" cy="2078013"/>
+          </a:xfrm>
+          <a:prstGeom prst="rect">
+            <a:avLst/>
+          </a:prstGeom>
+        </p:spPr>
+      </p:pic>
     </p:spTree>
   </p:cSld>
   <p:clrMapOvr>
@@ -1597,7 +2268,7 @@
           <p:nvPr/>
         </p:nvPicPr>
         <p:blipFill>
-          <a:blip r:embed="rId2">
+          <a:blip r:embed="rId3">
             <a:extLst>
               <a:ext uri="{28A0092B-C50C-407E-A947-70E740481C1C}">
                 <a14:useLocalDpi xmlns:a14="http://schemas.microsoft.com/office/drawing/2010/main" val="0"/>
@@ -1626,8 +2297,8 @@
         </p:nvSpPr>
         <p:spPr>
           <a:xfrm>
-            <a:off x="5901601" y="257937"/>
-            <a:ext cx="3088395" cy="461665"/>
+            <a:off x="4263992" y="257937"/>
+            <a:ext cx="4726005" cy="461665"/>
           </a:xfrm>
           <a:prstGeom prst="rect">
             <a:avLst/>
@@ -1649,7 +2320,7 @@
                 </a:solidFill>
                 <a:latin typeface="Humnst777 Blk BT" panose="020B0803030504030204" pitchFamily="34" charset="0"/>
               </a:rPr>
-              <a:t>Advanced topic</a:t>
+              <a:t>Benchmarking and Evaluation</a:t>
             </a:r>
             <a:endParaRPr lang="zh-CN" altLang="en-US" sz="2400" b="1" dirty="0">
               <a:solidFill>
@@ -1696,8 +2367,8 @@
         </p:nvSpPr>
         <p:spPr>
           <a:xfrm>
-            <a:off x="664143" y="1511166"/>
-            <a:ext cx="1848904" cy="923330"/>
+            <a:off x="455086" y="1275371"/>
+            <a:ext cx="8019820" cy="369332"/>
           </a:xfrm>
           <a:prstGeom prst="rect">
             <a:avLst/>
@@ -1705,25 +2376,49 @@
           <a:noFill/>
         </p:spPr>
         <p:txBody>
-          <a:bodyPr wrap="none" rtlCol="0">
+          <a:bodyPr wrap="square" rtlCol="0">
             <a:spAutoFit/>
           </a:bodyPr>
           <a:lstStyle/>
           <a:p>
             <a:r>
               <a:rPr lang="en-AU" dirty="0" smtClean="0"/>
-              <a:t>Execution time?? </a:t>
-            </a:r>
-          </a:p>
-          <a:p>
+              <a:t>This flow chart illustrates the process we use simulation data set for performance</a:t>
+            </a:r>
             <a:endParaRPr lang="en-AU" dirty="0"/>
           </a:p>
-          <a:p>
-            <a:endParaRPr lang="en-AU" dirty="0"/>
-          </a:p>
-        </p:txBody>
-      </p:sp>
+        </p:txBody>
+      </p:sp>
+      <p:pic>
+        <p:nvPicPr>
+          <p:cNvPr id="2" name="Picture 1"/>
+          <p:cNvPicPr>
+            <a:picLocks noChangeAspect="1"/>
+          </p:cNvPicPr>
+          <p:nvPr/>
+        </p:nvPicPr>
+        <p:blipFill>
+          <a:blip r:embed="rId4"/>
+          <a:stretch>
+            <a:fillRect/>
+          </a:stretch>
+        </p:blipFill>
+        <p:spPr>
+          <a:xfrm>
+            <a:off x="654518" y="1776822"/>
+            <a:ext cx="7565457" cy="3951887"/>
+          </a:xfrm>
+          <a:prstGeom prst="rect">
+            <a:avLst/>
+          </a:prstGeom>
+        </p:spPr>
+      </p:pic>
     </p:spTree>
+    <p:extLst>
+      <p:ext uri="{BB962C8B-B14F-4D97-AF65-F5344CB8AC3E}">
+        <p14:creationId xmlns:p14="http://schemas.microsoft.com/office/powerpoint/2010/main" val="235504692"/>
+      </p:ext>
+    </p:extLst>
   </p:cSld>
   <p:clrMapOvr>
     <a:masterClrMapping/>
@@ -1739,6 +2434,829 @@
 </file>
 
 <file path=ppt/slides/slide12.xml><?xml version="1.0" encoding="utf-8"?>
+<p:sld xmlns:a="http://schemas.openxmlformats.org/drawingml/2006/main" xmlns:r="http://schemas.openxmlformats.org/officeDocument/2006/relationships" xmlns:p="http://schemas.openxmlformats.org/presentationml/2006/main">
+  <p:cSld>
+    <p:spTree>
+      <p:nvGrpSpPr>
+        <p:cNvPr id="1" name=""/>
+        <p:cNvGrpSpPr/>
+        <p:nvPr/>
+      </p:nvGrpSpPr>
+      <p:grpSpPr>
+        <a:xfrm>
+          <a:off x="0" y="0"/>
+          <a:ext cx="0" cy="0"/>
+          <a:chOff x="0" y="0"/>
+          <a:chExt cx="0" cy="0"/>
+        </a:xfrm>
+      </p:grpSpPr>
+      <p:sp>
+        <p:nvSpPr>
+          <p:cNvPr id="8" name="矩形 7"/>
+          <p:cNvSpPr/>
+          <p:nvPr/>
+        </p:nvSpPr>
+        <p:spPr>
+          <a:xfrm>
+            <a:off x="0" y="0"/>
+            <a:ext cx="9144000" cy="952425"/>
+          </a:xfrm>
+          <a:prstGeom prst="rect">
+            <a:avLst/>
+          </a:prstGeom>
+          <a:solidFill>
+            <a:schemeClr val="tx1">
+              <a:lumMod val="65000"/>
+              <a:lumOff val="35000"/>
+            </a:schemeClr>
+          </a:solidFill>
+        </p:spPr>
+        <p:style>
+          <a:lnRef idx="2">
+            <a:schemeClr val="accent1">
+              <a:shade val="50000"/>
+            </a:schemeClr>
+          </a:lnRef>
+          <a:fillRef idx="1">
+            <a:schemeClr val="accent1"/>
+          </a:fillRef>
+          <a:effectRef idx="0">
+            <a:schemeClr val="accent1"/>
+          </a:effectRef>
+          <a:fontRef idx="minor">
+            <a:schemeClr val="lt1"/>
+          </a:fontRef>
+        </p:style>
+        <p:txBody>
+          <a:bodyPr rtlCol="0" anchor="ctr"/>
+          <a:lstStyle/>
+          <a:p>
+            <a:pPr algn="ctr"/>
+            <a:endParaRPr lang="zh-CN" altLang="en-US"/>
+          </a:p>
+        </p:txBody>
+      </p:sp>
+      <p:cxnSp>
+        <p:nvCxnSpPr>
+          <p:cNvPr id="9" name="直接连接符 8"/>
+          <p:cNvCxnSpPr/>
+          <p:nvPr/>
+        </p:nvCxnSpPr>
+        <p:spPr>
+          <a:xfrm>
+            <a:off x="0" y="6527260"/>
+            <a:ext cx="9212094" cy="9727"/>
+          </a:xfrm>
+          <a:prstGeom prst="line">
+            <a:avLst/>
+          </a:prstGeom>
+          <a:ln w="38100">
+            <a:solidFill>
+              <a:schemeClr val="tx1">
+                <a:lumMod val="50000"/>
+                <a:lumOff val="50000"/>
+              </a:schemeClr>
+            </a:solidFill>
+          </a:ln>
+        </p:spPr>
+        <p:style>
+          <a:lnRef idx="1">
+            <a:schemeClr val="accent1"/>
+          </a:lnRef>
+          <a:fillRef idx="0">
+            <a:schemeClr val="accent1"/>
+          </a:fillRef>
+          <a:effectRef idx="0">
+            <a:schemeClr val="accent1"/>
+          </a:effectRef>
+          <a:fontRef idx="minor">
+            <a:schemeClr val="tx1"/>
+          </a:fontRef>
+        </p:style>
+      </p:cxnSp>
+      <p:sp>
+        <p:nvSpPr>
+          <p:cNvPr id="3" name="文本框 2"/>
+          <p:cNvSpPr txBox="1"/>
+          <p:nvPr/>
+        </p:nvSpPr>
+        <p:spPr>
+          <a:xfrm>
+            <a:off x="8085862" y="6488668"/>
+            <a:ext cx="1058138" cy="369332"/>
+          </a:xfrm>
+          <a:prstGeom prst="rect">
+            <a:avLst/>
+          </a:prstGeom>
+          <a:noFill/>
+        </p:spPr>
+        <p:txBody>
+          <a:bodyPr wrap="square" rtlCol="0">
+            <a:spAutoFit/>
+          </a:bodyPr>
+          <a:lstStyle/>
+          <a:p>
+            <a:r>
+              <a:rPr lang="en-US" altLang="zh-CN" b="1" dirty="0" smtClean="0">
+                <a:solidFill>
+                  <a:schemeClr val="tx1">
+                    <a:lumMod val="50000"/>
+                    <a:lumOff val="50000"/>
+                  </a:schemeClr>
+                </a:solidFill>
+              </a:rPr>
+              <a:t>Group16</a:t>
+            </a:r>
+            <a:endParaRPr lang="zh-CN" altLang="en-US" b="1" dirty="0">
+              <a:solidFill>
+                <a:schemeClr val="tx1">
+                  <a:lumMod val="50000"/>
+                  <a:lumOff val="50000"/>
+                </a:schemeClr>
+              </a:solidFill>
+            </a:endParaRPr>
+          </a:p>
+        </p:txBody>
+      </p:sp>
+      <p:sp>
+        <p:nvSpPr>
+          <p:cNvPr id="15" name="文本框 14"/>
+          <p:cNvSpPr txBox="1"/>
+          <p:nvPr/>
+        </p:nvSpPr>
+        <p:spPr>
+          <a:xfrm>
+            <a:off x="66042" y="6504057"/>
+            <a:ext cx="1205546" cy="369332"/>
+          </a:xfrm>
+          <a:prstGeom prst="rect">
+            <a:avLst/>
+          </a:prstGeom>
+          <a:noFill/>
+        </p:spPr>
+        <p:txBody>
+          <a:bodyPr wrap="square" rtlCol="0">
+            <a:spAutoFit/>
+          </a:bodyPr>
+          <a:lstStyle/>
+          <a:p>
+            <a:r>
+              <a:rPr lang="en-US" altLang="zh-CN" sz="1600" b="1" dirty="0" smtClean="0">
+                <a:solidFill>
+                  <a:schemeClr val="tx1">
+                    <a:lumMod val="50000"/>
+                    <a:lumOff val="50000"/>
+                  </a:schemeClr>
+                </a:solidFill>
+              </a:rPr>
+              <a:t> </a:t>
+            </a:r>
+            <a:r>
+              <a:rPr lang="en-US" altLang="zh-CN" b="1" dirty="0" smtClean="0">
+                <a:solidFill>
+                  <a:schemeClr val="tx1">
+                    <a:lumMod val="50000"/>
+                    <a:lumOff val="50000"/>
+                  </a:schemeClr>
+                </a:solidFill>
+              </a:rPr>
+              <a:t>STAT5003</a:t>
+            </a:r>
+            <a:endParaRPr lang="zh-CN" altLang="en-US" b="1" dirty="0">
+              <a:solidFill>
+                <a:schemeClr val="tx1">
+                  <a:lumMod val="50000"/>
+                  <a:lumOff val="50000"/>
+                </a:schemeClr>
+              </a:solidFill>
+            </a:endParaRPr>
+          </a:p>
+        </p:txBody>
+      </p:sp>
+      <p:pic>
+        <p:nvPicPr>
+          <p:cNvPr id="14" name="图片 13"/>
+          <p:cNvPicPr>
+            <a:picLocks noChangeAspect="1"/>
+          </p:cNvPicPr>
+          <p:nvPr/>
+        </p:nvPicPr>
+        <p:blipFill>
+          <a:blip r:embed="rId3">
+            <a:extLst>
+              <a:ext uri="{28A0092B-C50C-407E-A947-70E740481C1C}">
+                <a14:useLocalDpi xmlns:a14="http://schemas.microsoft.com/office/drawing/2010/main" val="0"/>
+              </a:ext>
+            </a:extLst>
+          </a:blip>
+          <a:stretch>
+            <a:fillRect/>
+          </a:stretch>
+        </p:blipFill>
+        <p:spPr>
+          <a:xfrm>
+            <a:off x="226521" y="108186"/>
+            <a:ext cx="2201086" cy="761169"/>
+          </a:xfrm>
+          <a:prstGeom prst="rect">
+            <a:avLst/>
+          </a:prstGeom>
+        </p:spPr>
+      </p:pic>
+      <p:sp>
+        <p:nvSpPr>
+          <p:cNvPr id="7" name="文本框 6"/>
+          <p:cNvSpPr txBox="1"/>
+          <p:nvPr/>
+        </p:nvSpPr>
+        <p:spPr>
+          <a:xfrm>
+            <a:off x="4263992" y="257937"/>
+            <a:ext cx="4726005" cy="461665"/>
+          </a:xfrm>
+          <a:prstGeom prst="rect">
+            <a:avLst/>
+          </a:prstGeom>
+          <a:noFill/>
+        </p:spPr>
+        <p:txBody>
+          <a:bodyPr wrap="square" rtlCol="0">
+            <a:spAutoFit/>
+          </a:bodyPr>
+          <a:lstStyle/>
+          <a:p>
+            <a:r>
+              <a:rPr lang="en-AU" altLang="zh-CN" sz="2400" b="1" dirty="0" smtClean="0">
+                <a:solidFill>
+                  <a:schemeClr val="bg1">
+                    <a:lumMod val="95000"/>
+                  </a:schemeClr>
+                </a:solidFill>
+                <a:latin typeface="Humnst777 Blk BT" panose="020B0803030504030204" pitchFamily="34" charset="0"/>
+              </a:rPr>
+              <a:t>Benchmarking and Evaluation</a:t>
+            </a:r>
+            <a:endParaRPr lang="zh-CN" altLang="en-US" sz="2400" b="1" dirty="0">
+              <a:solidFill>
+                <a:schemeClr val="bg1">
+                  <a:lumMod val="95000"/>
+                </a:schemeClr>
+              </a:solidFill>
+              <a:latin typeface="Humnst777 Blk BT" panose="020B0803030504030204" pitchFamily="34" charset="0"/>
+            </a:endParaRPr>
+          </a:p>
+        </p:txBody>
+      </p:sp>
+      <p:sp>
+        <p:nvSpPr>
+          <p:cNvPr id="17" name="文本框 16"/>
+          <p:cNvSpPr txBox="1"/>
+          <p:nvPr/>
+        </p:nvSpPr>
+        <p:spPr>
+          <a:xfrm>
+            <a:off x="3249039" y="3730384"/>
+            <a:ext cx="2431914" cy="307777"/>
+          </a:xfrm>
+          <a:prstGeom prst="rect">
+            <a:avLst/>
+          </a:prstGeom>
+          <a:noFill/>
+        </p:spPr>
+        <p:txBody>
+          <a:bodyPr wrap="square" rtlCol="0">
+            <a:spAutoFit/>
+          </a:bodyPr>
+          <a:lstStyle/>
+          <a:p>
+            <a:endParaRPr lang="zh-CN" altLang="en-US" sz="1400" dirty="0"/>
+          </a:p>
+        </p:txBody>
+      </p:sp>
+      <p:sp>
+        <p:nvSpPr>
+          <p:cNvPr id="4" name="TextBox 3"/>
+          <p:cNvSpPr txBox="1"/>
+          <p:nvPr/>
+        </p:nvSpPr>
+        <p:spPr>
+          <a:xfrm>
+            <a:off x="455086" y="1275371"/>
+            <a:ext cx="8019820" cy="646331"/>
+          </a:xfrm>
+          <a:prstGeom prst="rect">
+            <a:avLst/>
+          </a:prstGeom>
+          <a:noFill/>
+        </p:spPr>
+        <p:txBody>
+          <a:bodyPr wrap="square" rtlCol="0">
+            <a:spAutoFit/>
+          </a:bodyPr>
+          <a:lstStyle/>
+          <a:p>
+            <a:r>
+              <a:rPr lang="en-AU" dirty="0" smtClean="0"/>
+              <a:t>Our simulation result is following the same probability distribution as the actual data</a:t>
+            </a:r>
+            <a:endParaRPr lang="en-AU" dirty="0"/>
+          </a:p>
+        </p:txBody>
+      </p:sp>
+      <p:pic>
+        <p:nvPicPr>
+          <p:cNvPr id="5" name="Picture 4"/>
+          <p:cNvPicPr>
+            <a:picLocks noChangeAspect="1"/>
+          </p:cNvPicPr>
+          <p:nvPr/>
+        </p:nvPicPr>
+        <p:blipFill>
+          <a:blip r:embed="rId4"/>
+          <a:stretch>
+            <a:fillRect/>
+          </a:stretch>
+        </p:blipFill>
+        <p:spPr>
+          <a:xfrm>
+            <a:off x="66042" y="2106541"/>
+            <a:ext cx="4445228" cy="2743341"/>
+          </a:xfrm>
+          <a:prstGeom prst="rect">
+            <a:avLst/>
+          </a:prstGeom>
+        </p:spPr>
+      </p:pic>
+      <p:pic>
+        <p:nvPicPr>
+          <p:cNvPr id="6" name="Picture 5"/>
+          <p:cNvPicPr>
+            <a:picLocks noChangeAspect="1"/>
+          </p:cNvPicPr>
+          <p:nvPr/>
+        </p:nvPicPr>
+        <p:blipFill>
+          <a:blip r:embed="rId5"/>
+          <a:stretch>
+            <a:fillRect/>
+          </a:stretch>
+        </p:blipFill>
+        <p:spPr>
+          <a:xfrm>
+            <a:off x="4511270" y="2106541"/>
+            <a:ext cx="4445228" cy="2743341"/>
+          </a:xfrm>
+          <a:prstGeom prst="rect">
+            <a:avLst/>
+          </a:prstGeom>
+        </p:spPr>
+      </p:pic>
+    </p:spTree>
+    <p:extLst>
+      <p:ext uri="{BB962C8B-B14F-4D97-AF65-F5344CB8AC3E}">
+        <p14:creationId xmlns:p14="http://schemas.microsoft.com/office/powerpoint/2010/main" val="449134364"/>
+      </p:ext>
+    </p:extLst>
+  </p:cSld>
+  <p:clrMapOvr>
+    <a:masterClrMapping/>
+  </p:clrMapOvr>
+  <p:timing>
+    <p:tnLst>
+      <p:par>
+        <p:cTn id="1" dur="indefinite" restart="never" nodeType="tmRoot"/>
+      </p:par>
+    </p:tnLst>
+  </p:timing>
+</p:sld>
+</file>
+
+<file path=ppt/slides/slide13.xml><?xml version="1.0" encoding="utf-8"?>
+<p:sld xmlns:a="http://schemas.openxmlformats.org/drawingml/2006/main" xmlns:r="http://schemas.openxmlformats.org/officeDocument/2006/relationships" xmlns:p="http://schemas.openxmlformats.org/presentationml/2006/main">
+  <p:cSld>
+    <p:spTree>
+      <p:nvGrpSpPr>
+        <p:cNvPr id="1" name=""/>
+        <p:cNvGrpSpPr/>
+        <p:nvPr/>
+      </p:nvGrpSpPr>
+      <p:grpSpPr>
+        <a:xfrm>
+          <a:off x="0" y="0"/>
+          <a:ext cx="0" cy="0"/>
+          <a:chOff x="0" y="0"/>
+          <a:chExt cx="0" cy="0"/>
+        </a:xfrm>
+      </p:grpSpPr>
+      <p:sp>
+        <p:nvSpPr>
+          <p:cNvPr id="8" name="矩形 7"/>
+          <p:cNvSpPr/>
+          <p:nvPr/>
+        </p:nvSpPr>
+        <p:spPr>
+          <a:xfrm>
+            <a:off x="0" y="0"/>
+            <a:ext cx="9144000" cy="952425"/>
+          </a:xfrm>
+          <a:prstGeom prst="rect">
+            <a:avLst/>
+          </a:prstGeom>
+          <a:solidFill>
+            <a:schemeClr val="tx1">
+              <a:lumMod val="65000"/>
+              <a:lumOff val="35000"/>
+            </a:schemeClr>
+          </a:solidFill>
+        </p:spPr>
+        <p:style>
+          <a:lnRef idx="2">
+            <a:schemeClr val="accent1">
+              <a:shade val="50000"/>
+            </a:schemeClr>
+          </a:lnRef>
+          <a:fillRef idx="1">
+            <a:schemeClr val="accent1"/>
+          </a:fillRef>
+          <a:effectRef idx="0">
+            <a:schemeClr val="accent1"/>
+          </a:effectRef>
+          <a:fontRef idx="minor">
+            <a:schemeClr val="lt1"/>
+          </a:fontRef>
+        </p:style>
+        <p:txBody>
+          <a:bodyPr rtlCol="0" anchor="ctr"/>
+          <a:lstStyle/>
+          <a:p>
+            <a:pPr algn="ctr"/>
+            <a:endParaRPr lang="zh-CN" altLang="en-US"/>
+          </a:p>
+        </p:txBody>
+      </p:sp>
+      <p:cxnSp>
+        <p:nvCxnSpPr>
+          <p:cNvPr id="9" name="直接连接符 8"/>
+          <p:cNvCxnSpPr/>
+          <p:nvPr/>
+        </p:nvCxnSpPr>
+        <p:spPr>
+          <a:xfrm>
+            <a:off x="0" y="6527260"/>
+            <a:ext cx="9212094" cy="9727"/>
+          </a:xfrm>
+          <a:prstGeom prst="line">
+            <a:avLst/>
+          </a:prstGeom>
+          <a:ln w="38100">
+            <a:solidFill>
+              <a:schemeClr val="tx1">
+                <a:lumMod val="50000"/>
+                <a:lumOff val="50000"/>
+              </a:schemeClr>
+            </a:solidFill>
+          </a:ln>
+        </p:spPr>
+        <p:style>
+          <a:lnRef idx="1">
+            <a:schemeClr val="accent1"/>
+          </a:lnRef>
+          <a:fillRef idx="0">
+            <a:schemeClr val="accent1"/>
+          </a:fillRef>
+          <a:effectRef idx="0">
+            <a:schemeClr val="accent1"/>
+          </a:effectRef>
+          <a:fontRef idx="minor">
+            <a:schemeClr val="tx1"/>
+          </a:fontRef>
+        </p:style>
+      </p:cxnSp>
+      <p:sp>
+        <p:nvSpPr>
+          <p:cNvPr id="3" name="文本框 2"/>
+          <p:cNvSpPr txBox="1"/>
+          <p:nvPr/>
+        </p:nvSpPr>
+        <p:spPr>
+          <a:xfrm>
+            <a:off x="8085862" y="6488668"/>
+            <a:ext cx="1058138" cy="369332"/>
+          </a:xfrm>
+          <a:prstGeom prst="rect">
+            <a:avLst/>
+          </a:prstGeom>
+          <a:noFill/>
+        </p:spPr>
+        <p:txBody>
+          <a:bodyPr wrap="square" rtlCol="0">
+            <a:spAutoFit/>
+          </a:bodyPr>
+          <a:lstStyle/>
+          <a:p>
+            <a:r>
+              <a:rPr lang="en-US" altLang="zh-CN" b="1" dirty="0" smtClean="0">
+                <a:solidFill>
+                  <a:schemeClr val="tx1">
+                    <a:lumMod val="50000"/>
+                    <a:lumOff val="50000"/>
+                  </a:schemeClr>
+                </a:solidFill>
+              </a:rPr>
+              <a:t>Group16</a:t>
+            </a:r>
+            <a:endParaRPr lang="zh-CN" altLang="en-US" b="1" dirty="0">
+              <a:solidFill>
+                <a:schemeClr val="tx1">
+                  <a:lumMod val="50000"/>
+                  <a:lumOff val="50000"/>
+                </a:schemeClr>
+              </a:solidFill>
+            </a:endParaRPr>
+          </a:p>
+        </p:txBody>
+      </p:sp>
+      <p:sp>
+        <p:nvSpPr>
+          <p:cNvPr id="15" name="文本框 14"/>
+          <p:cNvSpPr txBox="1"/>
+          <p:nvPr/>
+        </p:nvSpPr>
+        <p:spPr>
+          <a:xfrm>
+            <a:off x="66042" y="6504057"/>
+            <a:ext cx="1205546" cy="369332"/>
+          </a:xfrm>
+          <a:prstGeom prst="rect">
+            <a:avLst/>
+          </a:prstGeom>
+          <a:noFill/>
+        </p:spPr>
+        <p:txBody>
+          <a:bodyPr wrap="square" rtlCol="0">
+            <a:spAutoFit/>
+          </a:bodyPr>
+          <a:lstStyle/>
+          <a:p>
+            <a:r>
+              <a:rPr lang="en-US" altLang="zh-CN" sz="1600" b="1" dirty="0" smtClean="0">
+                <a:solidFill>
+                  <a:schemeClr val="tx1">
+                    <a:lumMod val="50000"/>
+                    <a:lumOff val="50000"/>
+                  </a:schemeClr>
+                </a:solidFill>
+              </a:rPr>
+              <a:t> </a:t>
+            </a:r>
+            <a:r>
+              <a:rPr lang="en-US" altLang="zh-CN" b="1" dirty="0" smtClean="0">
+                <a:solidFill>
+                  <a:schemeClr val="tx1">
+                    <a:lumMod val="50000"/>
+                    <a:lumOff val="50000"/>
+                  </a:schemeClr>
+                </a:solidFill>
+              </a:rPr>
+              <a:t>STAT5003</a:t>
+            </a:r>
+            <a:endParaRPr lang="zh-CN" altLang="en-US" b="1" dirty="0">
+              <a:solidFill>
+                <a:schemeClr val="tx1">
+                  <a:lumMod val="50000"/>
+                  <a:lumOff val="50000"/>
+                </a:schemeClr>
+              </a:solidFill>
+            </a:endParaRPr>
+          </a:p>
+        </p:txBody>
+      </p:sp>
+      <p:pic>
+        <p:nvPicPr>
+          <p:cNvPr id="14" name="图片 13"/>
+          <p:cNvPicPr>
+            <a:picLocks noChangeAspect="1"/>
+          </p:cNvPicPr>
+          <p:nvPr/>
+        </p:nvPicPr>
+        <p:blipFill>
+          <a:blip r:embed="rId2">
+            <a:extLst>
+              <a:ext uri="{28A0092B-C50C-407E-A947-70E740481C1C}">
+                <a14:useLocalDpi xmlns:a14="http://schemas.microsoft.com/office/drawing/2010/main" val="0"/>
+              </a:ext>
+            </a:extLst>
+          </a:blip>
+          <a:stretch>
+            <a:fillRect/>
+          </a:stretch>
+        </p:blipFill>
+        <p:spPr>
+          <a:xfrm>
+            <a:off x="226521" y="108186"/>
+            <a:ext cx="2201086" cy="761169"/>
+          </a:xfrm>
+          <a:prstGeom prst="rect">
+            <a:avLst/>
+          </a:prstGeom>
+        </p:spPr>
+      </p:pic>
+      <p:sp>
+        <p:nvSpPr>
+          <p:cNvPr id="7" name="文本框 6"/>
+          <p:cNvSpPr txBox="1"/>
+          <p:nvPr/>
+        </p:nvSpPr>
+        <p:spPr>
+          <a:xfrm>
+            <a:off x="6941493" y="257937"/>
+            <a:ext cx="2002053" cy="461665"/>
+          </a:xfrm>
+          <a:prstGeom prst="rect">
+            <a:avLst/>
+          </a:prstGeom>
+          <a:noFill/>
+        </p:spPr>
+        <p:txBody>
+          <a:bodyPr wrap="square" rtlCol="0">
+            <a:spAutoFit/>
+          </a:bodyPr>
+          <a:lstStyle/>
+          <a:p>
+            <a:r>
+              <a:rPr lang="en-AU" altLang="zh-CN" sz="2400" b="1" dirty="0" smtClean="0">
+                <a:solidFill>
+                  <a:schemeClr val="bg1">
+                    <a:lumMod val="95000"/>
+                  </a:schemeClr>
+                </a:solidFill>
+                <a:latin typeface="Humnst777 Blk BT" panose="020B0803030504030204" pitchFamily="34" charset="0"/>
+              </a:rPr>
+              <a:t>Conclusion</a:t>
+            </a:r>
+            <a:endParaRPr lang="zh-CN" altLang="en-US" sz="2400" b="1" dirty="0">
+              <a:solidFill>
+                <a:schemeClr val="bg1">
+                  <a:lumMod val="95000"/>
+                </a:schemeClr>
+              </a:solidFill>
+              <a:latin typeface="Humnst777 Blk BT" panose="020B0803030504030204" pitchFamily="34" charset="0"/>
+            </a:endParaRPr>
+          </a:p>
+        </p:txBody>
+      </p:sp>
+      <p:sp>
+        <p:nvSpPr>
+          <p:cNvPr id="4" name="TextBox 3"/>
+          <p:cNvSpPr txBox="1"/>
+          <p:nvPr/>
+        </p:nvSpPr>
+        <p:spPr>
+          <a:xfrm>
+            <a:off x="329932" y="1519537"/>
+            <a:ext cx="8337154" cy="3970318"/>
+          </a:xfrm>
+          <a:prstGeom prst="rect">
+            <a:avLst/>
+          </a:prstGeom>
+          <a:noFill/>
+        </p:spPr>
+        <p:txBody>
+          <a:bodyPr wrap="square" rtlCol="0">
+            <a:spAutoFit/>
+          </a:bodyPr>
+          <a:lstStyle/>
+          <a:p>
+            <a:r>
+              <a:rPr lang="en-AU" dirty="0" smtClean="0"/>
+              <a:t>Our Phase 1 prediction achieved a good result, especially for the </a:t>
+            </a:r>
+            <a:r>
+              <a:rPr lang="en-AU" dirty="0" err="1" smtClean="0"/>
+              <a:t>Akt</a:t>
+            </a:r>
+            <a:r>
+              <a:rPr lang="en-AU" dirty="0" smtClean="0"/>
+              <a:t> model.  </a:t>
+            </a:r>
+          </a:p>
+          <a:p>
+            <a:r>
+              <a:rPr lang="en-AU" dirty="0" smtClean="0"/>
+              <a:t>The 2017 vs 2016 distribution histogram shows that the majority of deltas are</a:t>
+            </a:r>
+          </a:p>
+          <a:p>
+            <a:r>
+              <a:rPr lang="en-AU" dirty="0" smtClean="0"/>
+              <a:t>within -5% to 5%. The spread is around -15% to 12%. </a:t>
+            </a:r>
+          </a:p>
+          <a:p>
+            <a:r>
+              <a:rPr lang="en-AU" dirty="0" smtClean="0"/>
+              <a:t>However, </a:t>
+            </a:r>
+            <a:r>
+              <a:rPr lang="en-AU" dirty="0" err="1" smtClean="0"/>
+              <a:t>mTOR</a:t>
+            </a:r>
+            <a:r>
+              <a:rPr lang="en-AU" dirty="0" smtClean="0"/>
+              <a:t> prediction result is showing a spread from -35% to 25% </a:t>
+            </a:r>
+          </a:p>
+          <a:p>
+            <a:endParaRPr lang="en-AU" dirty="0"/>
+          </a:p>
+          <a:p>
+            <a:r>
+              <a:rPr lang="en-AU" dirty="0" smtClean="0"/>
+              <a:t>From the phase </a:t>
+            </a:r>
+            <a:r>
+              <a:rPr lang="en-AU" dirty="0"/>
+              <a:t>1</a:t>
+            </a:r>
+            <a:r>
+              <a:rPr lang="en-AU" dirty="0" smtClean="0"/>
+              <a:t> result, we set up a negative threshold to create a negative sub-set and </a:t>
+            </a:r>
+          </a:p>
+          <a:p>
+            <a:r>
+              <a:rPr lang="en-AU" dirty="0" smtClean="0"/>
+              <a:t>use that sub-set as negative pool for random selection. Combined with positive data </a:t>
+            </a:r>
+          </a:p>
+          <a:p>
+            <a:r>
+              <a:rPr lang="en-AU" dirty="0" smtClean="0"/>
+              <a:t>do the prediction model again, iterative 1000 time and average the probability value</a:t>
+            </a:r>
+          </a:p>
+          <a:p>
+            <a:r>
+              <a:rPr lang="en-AU" dirty="0"/>
+              <a:t>a</a:t>
+            </a:r>
+            <a:r>
+              <a:rPr lang="en-AU" dirty="0" smtClean="0"/>
+              <a:t>s a result of adaptive sampling approach. </a:t>
+            </a:r>
+          </a:p>
+          <a:p>
+            <a:endParaRPr lang="en-AU" dirty="0"/>
+          </a:p>
+          <a:p>
+            <a:r>
+              <a:rPr lang="en-AU" dirty="0" smtClean="0"/>
+              <a:t>The adaptive sampling approach improved </a:t>
+            </a:r>
+            <a:r>
+              <a:rPr lang="en-AU" dirty="0" err="1" smtClean="0"/>
+              <a:t>mTOR</a:t>
+            </a:r>
+            <a:r>
+              <a:rPr lang="en-AU" dirty="0" smtClean="0"/>
+              <a:t> prediction result. Now we can see </a:t>
+            </a:r>
+          </a:p>
+          <a:p>
+            <a:r>
+              <a:rPr lang="en-AU" dirty="0" smtClean="0"/>
+              <a:t>That the majority of deltas are between -5% to 5%. The spread of deltas and the total </a:t>
+            </a:r>
+          </a:p>
+          <a:p>
+            <a:r>
+              <a:rPr lang="en-AU" dirty="0" smtClean="0"/>
+              <a:t>count of larger deltas was smaller than the Phase I result. </a:t>
+            </a:r>
+          </a:p>
+        </p:txBody>
+      </p:sp>
+    </p:spTree>
+    <p:extLst>
+      <p:ext uri="{BB962C8B-B14F-4D97-AF65-F5344CB8AC3E}">
+        <p14:creationId xmlns:p14="http://schemas.microsoft.com/office/powerpoint/2010/main" val="2843902213"/>
+      </p:ext>
+    </p:extLst>
+  </p:cSld>
+  <p:clrMapOvr>
+    <a:masterClrMapping/>
+  </p:clrMapOvr>
+  <p:timing>
+    <p:tnLst>
+      <p:par>
+        <p:cTn id="1" dur="indefinite" restart="never" nodeType="tmRoot"/>
+      </p:par>
+    </p:tnLst>
+  </p:timing>
+</p:sld>
+</file>
+
+<file path=ppt/slides/slide14.xml><?xml version="1.0" encoding="utf-8"?>
 <p:sld xmlns:a="http://schemas.openxmlformats.org/drawingml/2006/main" xmlns:r="http://schemas.openxmlformats.org/officeDocument/2006/relationships" xmlns:p="http://schemas.openxmlformats.org/presentationml/2006/main">
   <p:cSld>
     <p:spTree>
@@ -2403,7 +3921,7 @@
 </p:sld>
 </file>
 
-<file path=ppt/slides/slide13.xml><?xml version="1.0" encoding="utf-8"?>
+<file path=ppt/slides/slide15.xml><?xml version="1.0" encoding="utf-8"?>
 <p:sld xmlns:a="http://schemas.openxmlformats.org/drawingml/2006/main" xmlns:r="http://schemas.openxmlformats.org/officeDocument/2006/relationships" xmlns:p="http://schemas.openxmlformats.org/presentationml/2006/main">
   <p:cSld>
     <p:spTree>
@@ -4901,8 +6419,8 @@
         </p:nvSpPr>
         <p:spPr>
           <a:xfrm>
-            <a:off x="5901601" y="257937"/>
-            <a:ext cx="3088395" cy="461665"/>
+            <a:off x="4340995" y="257937"/>
+            <a:ext cx="4649002" cy="461665"/>
           </a:xfrm>
           <a:prstGeom prst="rect">
             <a:avLst/>
@@ -4924,7 +6442,7 @@
                 </a:solidFill>
                 <a:latin typeface="Humnst777 Blk BT" panose="020B0803030504030204" pitchFamily="34" charset="0"/>
               </a:rPr>
-              <a:t>Model build</a:t>
+              <a:t>Positive Unlabelled Learning</a:t>
             </a:r>
             <a:endParaRPr lang="zh-CN" altLang="en-US" sz="2400" b="1" dirty="0">
               <a:solidFill>
@@ -4965,14 +6483,65 @@
       </p:sp>
       <p:sp>
         <p:nvSpPr>
-          <p:cNvPr id="10" name="TextBox 9"/>
+          <p:cNvPr id="4" name="Oval 3"/>
+          <p:cNvSpPr/>
+          <p:nvPr/>
+        </p:nvSpPr>
+        <p:spPr>
+          <a:xfrm>
+            <a:off x="2337497" y="3451590"/>
+            <a:ext cx="1247694" cy="462012"/>
+          </a:xfrm>
+          <a:prstGeom prst="ellipse">
+            <a:avLst/>
+          </a:prstGeom>
+          <a:solidFill>
+            <a:srgbClr val="92D050"/>
+          </a:solidFill>
+        </p:spPr>
+        <p:style>
+          <a:lnRef idx="2">
+            <a:schemeClr val="accent1">
+              <a:shade val="50000"/>
+            </a:schemeClr>
+          </a:lnRef>
+          <a:fillRef idx="1">
+            <a:schemeClr val="accent1"/>
+          </a:fillRef>
+          <a:effectRef idx="0">
+            <a:schemeClr val="accent1"/>
+          </a:effectRef>
+          <a:fontRef idx="minor">
+            <a:schemeClr val="lt1"/>
+          </a:fontRef>
+        </p:style>
+        <p:txBody>
+          <a:bodyPr rtlCol="0" anchor="ctr"/>
+          <a:lstStyle/>
+          <a:p>
+            <a:pPr algn="ctr"/>
+            <a:r>
+              <a:rPr lang="en-AU" sz="1200" dirty="0" smtClean="0"/>
+              <a:t>22 known </a:t>
+            </a:r>
+            <a:r>
+              <a:rPr lang="en-AU" sz="1200" dirty="0" err="1" smtClean="0"/>
+              <a:t>Akt</a:t>
+            </a:r>
+            <a:endParaRPr lang="en-AU" sz="1200" dirty="0"/>
+          </a:p>
+        </p:txBody>
+      </p:sp>
+      <p:sp>
+        <p:nvSpPr>
+          <p:cNvPr id="5" name="TextBox 4"/>
           <p:cNvSpPr txBox="1"/>
           <p:nvPr/>
         </p:nvSpPr>
         <p:spPr>
           <a:xfrm>
-            <a:off x="452388" y="1410153"/>
-            <a:ext cx="8082725" cy="2308324"/>
+            <a:off x="474054" y="1132569"/>
+            <a:ext cx="3180230" cy="1200329"/>
           </a:xfrm>
           <a:prstGeom prst="rect">
             <a:avLst/>
@@ -4987,25 +6556,8 @@
           <a:p>
             <a:r>
               <a:rPr lang="en-AU" dirty="0" smtClean="0"/>
-              <a:t>Model evaluation results showing GBM and SVM Polynomial are the best models, so</a:t>
-            </a:r>
-          </a:p>
-          <a:p>
-            <a:r>
-              <a:rPr lang="en-AU" dirty="0" smtClean="0"/>
-              <a:t>We built 2 models with different </a:t>
-            </a:r>
-            <a:r>
-              <a:rPr lang="en-AU" dirty="0" err="1" smtClean="0"/>
-              <a:t>inbalance</a:t>
-            </a:r>
-            <a:r>
-              <a:rPr lang="en-AU" dirty="0" smtClean="0"/>
-              <a:t> technic: </a:t>
-            </a:r>
-          </a:p>
-          <a:p>
-            <a:endParaRPr lang="en-AU" dirty="0"/>
+              <a:t>Problems we need to solve are: </a:t>
+            </a:r>
           </a:p>
           <a:p>
             <a:pPr marL="342900" indent="-342900">
@@ -5013,7 +6565,7 @@
             </a:pPr>
             <a:r>
               <a:rPr lang="en-AU" dirty="0" smtClean="0"/>
-              <a:t>SVM – bagging </a:t>
+              <a:t>Unbalanced data </a:t>
             </a:r>
           </a:p>
           <a:p>
@@ -5022,22 +6574,398 @@
             </a:pPr>
             <a:r>
               <a:rPr lang="en-AU" dirty="0" smtClean="0"/>
-              <a:t>GBM – boosting </a:t>
+              <a:t>Semi-supervised learning</a:t>
             </a:r>
           </a:p>
           <a:p>
             <a:pPr marL="342900" indent="-342900">
               <a:buAutoNum type="arabicParenR"/>
             </a:pPr>
-            <a:endParaRPr lang="en-AU" dirty="0"/>
-          </a:p>
-          <a:p>
             <a:r>
               <a:rPr lang="en-AU" dirty="0" smtClean="0"/>
               <a:t>Adaptive sampling </a:t>
             </a:r>
-          </a:p>
-          <a:p>
+            <a:endParaRPr lang="en-AU" dirty="0"/>
+          </a:p>
+        </p:txBody>
+      </p:sp>
+      <p:sp>
+        <p:nvSpPr>
+          <p:cNvPr id="6" name="Oval 5"/>
+          <p:cNvSpPr/>
+          <p:nvPr/>
+        </p:nvSpPr>
+        <p:spPr>
+          <a:xfrm>
+            <a:off x="404260" y="2422128"/>
+            <a:ext cx="1467993" cy="682952"/>
+          </a:xfrm>
+          <a:prstGeom prst="ellipse">
+            <a:avLst/>
+          </a:prstGeom>
+          <a:solidFill>
+            <a:srgbClr val="FFC000"/>
+          </a:solidFill>
+        </p:spPr>
+        <p:style>
+          <a:lnRef idx="2">
+            <a:schemeClr val="accent1">
+              <a:shade val="50000"/>
+            </a:schemeClr>
+          </a:lnRef>
+          <a:fillRef idx="1">
+            <a:schemeClr val="accent1"/>
+          </a:fillRef>
+          <a:effectRef idx="0">
+            <a:schemeClr val="accent1"/>
+          </a:effectRef>
+          <a:fontRef idx="minor">
+            <a:schemeClr val="lt1"/>
+          </a:fontRef>
+        </p:style>
+        <p:txBody>
+          <a:bodyPr rtlCol="0" anchor="ctr"/>
+          <a:lstStyle/>
+          <a:p>
+            <a:pPr algn="ctr"/>
+            <a:r>
+              <a:rPr lang="en-AU" sz="1200" dirty="0" smtClean="0">
+                <a:solidFill>
+                  <a:srgbClr val="FF0000"/>
+                </a:solidFill>
+              </a:rPr>
+              <a:t>12k + </a:t>
+            </a:r>
+            <a:r>
+              <a:rPr lang="en-AU" sz="1200" dirty="0" err="1" smtClean="0">
+                <a:solidFill>
+                  <a:srgbClr val="FF0000"/>
+                </a:solidFill>
+              </a:rPr>
+              <a:t>unlabeld</a:t>
+            </a:r>
+            <a:r>
+              <a:rPr lang="en-AU" sz="1200" dirty="0" smtClean="0">
+                <a:solidFill>
+                  <a:srgbClr val="FF0000"/>
+                </a:solidFill>
+              </a:rPr>
+              <a:t> data</a:t>
+            </a:r>
+            <a:endParaRPr lang="en-AU" sz="1200" dirty="0">
+              <a:solidFill>
+                <a:srgbClr val="FF0000"/>
+              </a:solidFill>
+            </a:endParaRPr>
+          </a:p>
+        </p:txBody>
+      </p:sp>
+      <p:sp>
+        <p:nvSpPr>
+          <p:cNvPr id="16" name="Oval 15"/>
+          <p:cNvSpPr/>
+          <p:nvPr/>
+        </p:nvSpPr>
+        <p:spPr>
+          <a:xfrm>
+            <a:off x="497693" y="3498683"/>
+            <a:ext cx="1247694" cy="462012"/>
+          </a:xfrm>
+          <a:prstGeom prst="ellipse">
+            <a:avLst/>
+          </a:prstGeom>
+        </p:spPr>
+        <p:style>
+          <a:lnRef idx="2">
+            <a:schemeClr val="accent1">
+              <a:shade val="50000"/>
+            </a:schemeClr>
+          </a:lnRef>
+          <a:fillRef idx="1">
+            <a:schemeClr val="accent1"/>
+          </a:fillRef>
+          <a:effectRef idx="0">
+            <a:schemeClr val="accent1"/>
+          </a:effectRef>
+          <a:fontRef idx="minor">
+            <a:schemeClr val="lt1"/>
+          </a:fontRef>
+        </p:style>
+        <p:txBody>
+          <a:bodyPr rtlCol="0" anchor="ctr"/>
+          <a:lstStyle/>
+          <a:p>
+            <a:pPr algn="ctr"/>
+            <a:r>
+              <a:rPr lang="en-AU" sz="1200" dirty="0" smtClean="0"/>
+              <a:t>Randomly select 22</a:t>
+            </a:r>
+            <a:endParaRPr lang="en-AU" sz="1200" dirty="0"/>
+          </a:p>
+        </p:txBody>
+      </p:sp>
+      <p:sp>
+        <p:nvSpPr>
+          <p:cNvPr id="25" name="TextBox 24"/>
+          <p:cNvSpPr txBox="1"/>
+          <p:nvPr/>
+        </p:nvSpPr>
+        <p:spPr>
+          <a:xfrm>
+            <a:off x="595017" y="4422707"/>
+            <a:ext cx="3665179" cy="1754326"/>
+          </a:xfrm>
+          <a:prstGeom prst="rect">
+            <a:avLst/>
+          </a:prstGeom>
+          <a:noFill/>
+        </p:spPr>
+        <p:txBody>
+          <a:bodyPr wrap="square" rtlCol="0">
+            <a:spAutoFit/>
+          </a:bodyPr>
+          <a:lstStyle/>
+          <a:p>
+            <a:r>
+              <a:rPr lang="en-AU" dirty="0" smtClean="0"/>
+              <a:t>- We built model.</a:t>
+            </a:r>
+          </a:p>
+          <a:p>
+            <a:r>
+              <a:rPr lang="en-AU" dirty="0" smtClean="0"/>
+              <a:t>- Predicted full data set.</a:t>
+            </a:r>
+          </a:p>
+          <a:p>
+            <a:r>
+              <a:rPr lang="en-AU" dirty="0" smtClean="0"/>
+              <a:t>- Saved the results.</a:t>
+            </a:r>
+          </a:p>
+          <a:p>
+            <a:r>
+              <a:rPr lang="en-AU" dirty="0" smtClean="0"/>
+              <a:t>- Iterated the sample process 1000  times. </a:t>
+            </a:r>
+          </a:p>
+          <a:p>
+            <a:r>
+              <a:rPr lang="en-AU" dirty="0" smtClean="0"/>
+              <a:t>- Average the probability value</a:t>
+            </a:r>
+          </a:p>
+        </p:txBody>
+      </p:sp>
+      <p:cxnSp>
+        <p:nvCxnSpPr>
+          <p:cNvPr id="27" name="Straight Arrow Connector 26"/>
+          <p:cNvCxnSpPr>
+            <a:endCxn id="16" idx="0"/>
+          </p:cNvCxnSpPr>
+          <p:nvPr/>
+        </p:nvCxnSpPr>
+        <p:spPr>
+          <a:xfrm>
+            <a:off x="1121540" y="3177670"/>
+            <a:ext cx="0" cy="321013"/>
+          </a:xfrm>
+          <a:prstGeom prst="straightConnector1">
+            <a:avLst/>
+          </a:prstGeom>
+          <a:ln>
+            <a:tailEnd type="triangle"/>
+          </a:ln>
+        </p:spPr>
+        <p:style>
+          <a:lnRef idx="1">
+            <a:schemeClr val="accent1"/>
+          </a:lnRef>
+          <a:fillRef idx="0">
+            <a:schemeClr val="accent1"/>
+          </a:fillRef>
+          <a:effectRef idx="0">
+            <a:schemeClr val="accent1"/>
+          </a:effectRef>
+          <a:fontRef idx="minor">
+            <a:schemeClr val="tx1"/>
+          </a:fontRef>
+        </p:style>
+      </p:cxnSp>
+      <p:cxnSp>
+        <p:nvCxnSpPr>
+          <p:cNvPr id="29" name="Straight Connector 28"/>
+          <p:cNvCxnSpPr/>
+          <p:nvPr/>
+        </p:nvCxnSpPr>
+        <p:spPr>
+          <a:xfrm flipV="1">
+            <a:off x="1117124" y="4247576"/>
+            <a:ext cx="1839804" cy="18311"/>
+          </a:xfrm>
+          <a:prstGeom prst="line">
+            <a:avLst/>
+          </a:prstGeom>
+        </p:spPr>
+        <p:style>
+          <a:lnRef idx="1">
+            <a:schemeClr val="accent1"/>
+          </a:lnRef>
+          <a:fillRef idx="0">
+            <a:schemeClr val="accent1"/>
+          </a:fillRef>
+          <a:effectRef idx="0">
+            <a:schemeClr val="accent1"/>
+          </a:effectRef>
+          <a:fontRef idx="minor">
+            <a:schemeClr val="tx1"/>
+          </a:fontRef>
+        </p:style>
+      </p:cxnSp>
+      <p:cxnSp>
+        <p:nvCxnSpPr>
+          <p:cNvPr id="31" name="Straight Arrow Connector 30"/>
+          <p:cNvCxnSpPr>
+            <a:endCxn id="4" idx="4"/>
+          </p:cNvCxnSpPr>
+          <p:nvPr/>
+        </p:nvCxnSpPr>
+        <p:spPr>
+          <a:xfrm flipV="1">
+            <a:off x="2961344" y="3913602"/>
+            <a:ext cx="0" cy="343130"/>
+          </a:xfrm>
+          <a:prstGeom prst="straightConnector1">
+            <a:avLst/>
+          </a:prstGeom>
+          <a:ln>
+            <a:tailEnd type="triangle"/>
+          </a:ln>
+        </p:spPr>
+        <p:style>
+          <a:lnRef idx="1">
+            <a:schemeClr val="accent1"/>
+          </a:lnRef>
+          <a:fillRef idx="0">
+            <a:schemeClr val="accent1"/>
+          </a:fillRef>
+          <a:effectRef idx="0">
+            <a:schemeClr val="accent1"/>
+          </a:effectRef>
+          <a:fontRef idx="minor">
+            <a:schemeClr val="tx1"/>
+          </a:fontRef>
+        </p:style>
+      </p:cxnSp>
+      <p:pic>
+        <p:nvPicPr>
+          <p:cNvPr id="34" name="Picture 33"/>
+          <p:cNvPicPr>
+            <a:picLocks noChangeAspect="1"/>
+          </p:cNvPicPr>
+          <p:nvPr/>
+        </p:nvPicPr>
+        <p:blipFill>
+          <a:blip r:embed="rId3"/>
+          <a:stretch>
+            <a:fillRect/>
+          </a:stretch>
+        </p:blipFill>
+        <p:spPr>
+          <a:xfrm>
+            <a:off x="4464996" y="1460342"/>
+            <a:ext cx="4445228" cy="2193091"/>
+          </a:xfrm>
+          <a:prstGeom prst="rect">
+            <a:avLst/>
+          </a:prstGeom>
+        </p:spPr>
+      </p:pic>
+      <p:pic>
+        <p:nvPicPr>
+          <p:cNvPr id="35" name="Picture 34"/>
+          <p:cNvPicPr>
+            <a:picLocks noChangeAspect="1"/>
+          </p:cNvPicPr>
+          <p:nvPr/>
+        </p:nvPicPr>
+        <p:blipFill>
+          <a:blip r:embed="rId4"/>
+          <a:stretch>
+            <a:fillRect/>
+          </a:stretch>
+        </p:blipFill>
+        <p:spPr>
+          <a:xfrm>
+            <a:off x="4442882" y="3665035"/>
+            <a:ext cx="4445228" cy="2541212"/>
+          </a:xfrm>
+          <a:prstGeom prst="rect">
+            <a:avLst/>
+          </a:prstGeom>
+        </p:spPr>
+      </p:pic>
+      <p:cxnSp>
+        <p:nvCxnSpPr>
+          <p:cNvPr id="38" name="Straight Arrow Connector 37"/>
+          <p:cNvCxnSpPr>
+            <a:endCxn id="16" idx="4"/>
+          </p:cNvCxnSpPr>
+          <p:nvPr/>
+        </p:nvCxnSpPr>
+        <p:spPr>
+          <a:xfrm flipV="1">
+            <a:off x="1121540" y="3960695"/>
+            <a:ext cx="0" cy="296037"/>
+          </a:xfrm>
+          <a:prstGeom prst="straightConnector1">
+            <a:avLst/>
+          </a:prstGeom>
+          <a:ln>
+            <a:tailEnd type="triangle"/>
+          </a:ln>
+        </p:spPr>
+        <p:style>
+          <a:lnRef idx="1">
+            <a:schemeClr val="accent1"/>
+          </a:lnRef>
+          <a:fillRef idx="0">
+            <a:schemeClr val="accent1"/>
+          </a:fillRef>
+          <a:effectRef idx="0">
+            <a:schemeClr val="accent1"/>
+          </a:effectRef>
+          <a:fontRef idx="minor">
+            <a:schemeClr val="tx1"/>
+          </a:fontRef>
+        </p:style>
+      </p:cxnSp>
+      <p:sp>
+        <p:nvSpPr>
+          <p:cNvPr id="39" name="TextBox 38"/>
+          <p:cNvSpPr txBox="1"/>
+          <p:nvPr/>
+        </p:nvSpPr>
+        <p:spPr>
+          <a:xfrm>
+            <a:off x="4716379" y="1017774"/>
+            <a:ext cx="1500924" cy="369332"/>
+          </a:xfrm>
+          <a:prstGeom prst="rect">
+            <a:avLst/>
+          </a:prstGeom>
+          <a:noFill/>
+        </p:spPr>
+        <p:txBody>
+          <a:bodyPr wrap="none" rtlCol="0">
+            <a:spAutoFit/>
+          </a:bodyPr>
+          <a:lstStyle/>
+          <a:p>
+            <a:r>
+              <a:rPr lang="en-AU" dirty="0" smtClean="0"/>
+              <a:t>Phase I result:</a:t>
+            </a:r>
             <a:endParaRPr lang="en-AU" dirty="0"/>
           </a:p>
         </p:txBody>
@@ -5295,8 +7223,8 @@
         </p:nvSpPr>
         <p:spPr>
           <a:xfrm>
-            <a:off x="5680953" y="257937"/>
-            <a:ext cx="3309043" cy="461665"/>
+            <a:off x="4340995" y="257937"/>
+            <a:ext cx="4649002" cy="461665"/>
           </a:xfrm>
           <a:prstGeom prst="rect">
             <a:avLst/>
@@ -5318,7 +7246,7 @@
                 </a:solidFill>
                 <a:latin typeface="Humnst777 Blk BT" panose="020B0803030504030204" pitchFamily="34" charset="0"/>
               </a:rPr>
-              <a:t>Prediction outcomes</a:t>
+              <a:t>Positive Unlabelled Learning</a:t>
             </a:r>
             <a:endParaRPr lang="zh-CN" altLang="en-US" sz="2400" b="1" dirty="0">
               <a:solidFill>
@@ -5357,16 +7285,46 @@
           </a:p>
         </p:txBody>
       </p:sp>
-      <p:sp>
-        <p:nvSpPr>
-          <p:cNvPr id="2" name="TextBox 1"/>
+      <p:pic>
+        <p:nvPicPr>
+          <p:cNvPr id="12" name="Picture 11"/>
+          <p:cNvPicPr>
+            <a:picLocks noChangeAspect="1"/>
+          </p:cNvPicPr>
+          <p:nvPr/>
+        </p:nvPicPr>
+        <p:blipFill>
+          <a:blip r:embed="rId3">
+            <a:extLst>
+              <a:ext uri="{28A0092B-C50C-407E-A947-70E740481C1C}">
+                <a14:useLocalDpi xmlns:a14="http://schemas.microsoft.com/office/drawing/2010/main" val="0"/>
+              </a:ext>
+            </a:extLst>
+          </a:blip>
+          <a:stretch>
+            <a:fillRect/>
+          </a:stretch>
+        </p:blipFill>
+        <p:spPr>
+          <a:xfrm>
+            <a:off x="226521" y="1708708"/>
+            <a:ext cx="3954780" cy="395091"/>
+          </a:xfrm>
+          <a:prstGeom prst="rect">
+            <a:avLst/>
+          </a:prstGeom>
+        </p:spPr>
+      </p:pic>
+      <p:sp>
+        <p:nvSpPr>
+          <p:cNvPr id="13" name="TextBox 12"/>
           <p:cNvSpPr txBox="1"/>
           <p:nvPr/>
         </p:nvSpPr>
         <p:spPr>
           <a:xfrm>
-            <a:off x="693019" y="1472665"/>
-            <a:ext cx="8173520" cy="3139321"/>
+            <a:off x="211971" y="1356914"/>
+            <a:ext cx="2119234" cy="369332"/>
           </a:xfrm>
           <a:prstGeom prst="rect">
             <a:avLst/>
@@ -5380,95 +7338,583 @@
           <a:lstStyle/>
           <a:p>
             <a:r>
-              <a:rPr lang="en-AU" dirty="0" smtClean="0"/>
-              <a:t>Results showing GBM is better model based on accuracy on labelled data, any other</a:t>
-            </a:r>
-          </a:p>
-          <a:p>
-            <a:r>
-              <a:rPr lang="en-AU" dirty="0" smtClean="0"/>
-              <a:t>Validation/evaluation technic?? </a:t>
-            </a:r>
-          </a:p>
-          <a:p>
-            <a:endParaRPr lang="en-AU" dirty="0"/>
-          </a:p>
-          <a:p>
-            <a:r>
-              <a:rPr lang="en-AU" dirty="0" smtClean="0"/>
-              <a:t>Threshold of probability value for </a:t>
-            </a:r>
-            <a:r>
               <a:rPr lang="en-AU" dirty="0" err="1" smtClean="0"/>
               <a:t>Akt</a:t>
             </a:r>
             <a:r>
               <a:rPr lang="en-AU" dirty="0" smtClean="0"/>
-              <a:t>: ??? 90% or 80%? Or do we need to consider</a:t>
-            </a:r>
-          </a:p>
-          <a:p>
+              <a:t> probability value</a:t>
+            </a:r>
+            <a:endParaRPr lang="en-AU" dirty="0"/>
+          </a:p>
+        </p:txBody>
+      </p:sp>
+      <p:cxnSp>
+        <p:nvCxnSpPr>
+          <p:cNvPr id="19" name="Straight Connector 18"/>
+          <p:cNvCxnSpPr>
+            <a:stCxn id="12" idx="2"/>
+          </p:cNvCxnSpPr>
+          <p:nvPr/>
+        </p:nvCxnSpPr>
+        <p:spPr>
+          <a:xfrm>
+            <a:off x="2203911" y="2103799"/>
+            <a:ext cx="0" cy="116968"/>
+          </a:xfrm>
+          <a:prstGeom prst="line">
+            <a:avLst/>
+          </a:prstGeom>
+        </p:spPr>
+        <p:style>
+          <a:lnRef idx="1">
+            <a:schemeClr val="accent1"/>
+          </a:lnRef>
+          <a:fillRef idx="0">
+            <a:schemeClr val="accent1"/>
+          </a:fillRef>
+          <a:effectRef idx="0">
+            <a:schemeClr val="accent1"/>
+          </a:effectRef>
+          <a:fontRef idx="minor">
+            <a:schemeClr val="tx1"/>
+          </a:fontRef>
+        </p:style>
+      </p:cxnSp>
+      <p:sp>
+        <p:nvSpPr>
+          <p:cNvPr id="20" name="TextBox 19"/>
+          <p:cNvSpPr txBox="1"/>
+          <p:nvPr/>
+        </p:nvSpPr>
+        <p:spPr>
+          <a:xfrm>
+            <a:off x="1977727" y="2159814"/>
+            <a:ext cx="452368" cy="276999"/>
+          </a:xfrm>
+          <a:prstGeom prst="rect">
+            <a:avLst/>
+          </a:prstGeom>
+          <a:noFill/>
+        </p:spPr>
+        <p:txBody>
+          <a:bodyPr wrap="none" rtlCol="0">
+            <a:spAutoFit/>
+          </a:bodyPr>
+          <a:lstStyle/>
+          <a:p>
+            <a:r>
+              <a:rPr lang="en-AU" sz="1200" dirty="0" smtClean="0"/>
+              <a:t>50%</a:t>
+            </a:r>
+            <a:endParaRPr lang="en-AU" sz="1200" dirty="0"/>
+          </a:p>
+        </p:txBody>
+      </p:sp>
+      <p:sp>
+        <p:nvSpPr>
+          <p:cNvPr id="30" name="Oval 29"/>
+          <p:cNvSpPr/>
+          <p:nvPr/>
+        </p:nvSpPr>
+        <p:spPr>
+          <a:xfrm>
+            <a:off x="637265" y="2742404"/>
+            <a:ext cx="1247694" cy="462012"/>
+          </a:xfrm>
+          <a:prstGeom prst="ellipse">
+            <a:avLst/>
+          </a:prstGeom>
+          <a:solidFill>
+            <a:srgbClr val="92D050"/>
+          </a:solidFill>
+        </p:spPr>
+        <p:style>
+          <a:lnRef idx="2">
+            <a:schemeClr val="accent1">
+              <a:shade val="50000"/>
+            </a:schemeClr>
+          </a:lnRef>
+          <a:fillRef idx="1">
+            <a:schemeClr val="accent1"/>
+          </a:fillRef>
+          <a:effectRef idx="0">
+            <a:schemeClr val="accent1"/>
+          </a:effectRef>
+          <a:fontRef idx="minor">
+            <a:schemeClr val="lt1"/>
+          </a:fontRef>
+        </p:style>
+        <p:txBody>
+          <a:bodyPr rtlCol="0" anchor="ctr"/>
+          <a:lstStyle/>
+          <a:p>
+            <a:pPr algn="ctr"/>
+            <a:r>
+              <a:rPr lang="en-AU" sz="1200" dirty="0" smtClean="0"/>
+              <a:t>22 known </a:t>
+            </a:r>
+            <a:r>
+              <a:rPr lang="en-AU" sz="1200" dirty="0" err="1" smtClean="0"/>
+              <a:t>Akt</a:t>
+            </a:r>
+            <a:endParaRPr lang="en-AU" sz="1200" dirty="0"/>
+          </a:p>
+        </p:txBody>
+      </p:sp>
+      <p:sp>
+        <p:nvSpPr>
+          <p:cNvPr id="32" name="Oval 31"/>
+          <p:cNvSpPr/>
+          <p:nvPr/>
+        </p:nvSpPr>
+        <p:spPr>
+          <a:xfrm>
+            <a:off x="2591443" y="2700021"/>
+            <a:ext cx="1247694" cy="462012"/>
+          </a:xfrm>
+          <a:prstGeom prst="ellipse">
+            <a:avLst/>
+          </a:prstGeom>
+        </p:spPr>
+        <p:style>
+          <a:lnRef idx="2">
+            <a:schemeClr val="accent1">
+              <a:shade val="50000"/>
+            </a:schemeClr>
+          </a:lnRef>
+          <a:fillRef idx="1">
+            <a:schemeClr val="accent1"/>
+          </a:fillRef>
+          <a:effectRef idx="0">
+            <a:schemeClr val="accent1"/>
+          </a:effectRef>
+          <a:fontRef idx="minor">
+            <a:schemeClr val="lt1"/>
+          </a:fontRef>
+        </p:style>
+        <p:txBody>
+          <a:bodyPr rtlCol="0" anchor="ctr"/>
+          <a:lstStyle/>
+          <a:p>
+            <a:pPr algn="ctr"/>
+            <a:r>
+              <a:rPr lang="en-AU" sz="1200" dirty="0" smtClean="0"/>
+              <a:t>Randomly select 22 </a:t>
+            </a:r>
+            <a:endParaRPr lang="en-AU" sz="1200" dirty="0"/>
+          </a:p>
+        </p:txBody>
+      </p:sp>
+      <p:cxnSp>
+        <p:nvCxnSpPr>
+          <p:cNvPr id="26" name="Straight Arrow Connector 25"/>
+          <p:cNvCxnSpPr>
+            <a:stCxn id="20" idx="3"/>
+          </p:cNvCxnSpPr>
+          <p:nvPr/>
+        </p:nvCxnSpPr>
+        <p:spPr>
+          <a:xfrm flipV="1">
+            <a:off x="2430095" y="2298313"/>
+            <a:ext cx="1751206" cy="1"/>
+          </a:xfrm>
+          <a:prstGeom prst="straightConnector1">
+            <a:avLst/>
+          </a:prstGeom>
+          <a:ln>
+            <a:tailEnd type="triangle"/>
+          </a:ln>
+        </p:spPr>
+        <p:style>
+          <a:lnRef idx="1">
+            <a:schemeClr val="accent1"/>
+          </a:lnRef>
+          <a:fillRef idx="0">
+            <a:schemeClr val="accent1"/>
+          </a:fillRef>
+          <a:effectRef idx="0">
+            <a:schemeClr val="accent1"/>
+          </a:effectRef>
+          <a:fontRef idx="minor">
+            <a:schemeClr val="tx1"/>
+          </a:fontRef>
+        </p:style>
+      </p:cxnSp>
+      <p:cxnSp>
+        <p:nvCxnSpPr>
+          <p:cNvPr id="38" name="Straight Arrow Connector 37"/>
+          <p:cNvCxnSpPr>
+            <a:endCxn id="32" idx="0"/>
+          </p:cNvCxnSpPr>
+          <p:nvPr/>
+        </p:nvCxnSpPr>
+        <p:spPr>
+          <a:xfrm>
+            <a:off x="3215290" y="2367822"/>
+            <a:ext cx="0" cy="332199"/>
+          </a:xfrm>
+          <a:prstGeom prst="straightConnector1">
+            <a:avLst/>
+          </a:prstGeom>
+          <a:ln>
+            <a:tailEnd type="triangle"/>
+          </a:ln>
+        </p:spPr>
+        <p:style>
+          <a:lnRef idx="1">
+            <a:schemeClr val="accent1"/>
+          </a:lnRef>
+          <a:fillRef idx="0">
+            <a:schemeClr val="accent1"/>
+          </a:fillRef>
+          <a:effectRef idx="0">
+            <a:schemeClr val="accent1"/>
+          </a:effectRef>
+          <a:fontRef idx="minor">
+            <a:schemeClr val="tx1"/>
+          </a:fontRef>
+        </p:style>
+      </p:cxnSp>
+      <p:cxnSp>
+        <p:nvCxnSpPr>
+          <p:cNvPr id="44" name="Straight Arrow Connector 43"/>
+          <p:cNvCxnSpPr>
+            <a:endCxn id="32" idx="4"/>
+          </p:cNvCxnSpPr>
+          <p:nvPr/>
+        </p:nvCxnSpPr>
+        <p:spPr>
+          <a:xfrm flipV="1">
+            <a:off x="3215290" y="3162033"/>
+            <a:ext cx="0" cy="308476"/>
+          </a:xfrm>
+          <a:prstGeom prst="straightConnector1">
+            <a:avLst/>
+          </a:prstGeom>
+          <a:ln>
+            <a:tailEnd type="triangle"/>
+          </a:ln>
+        </p:spPr>
+        <p:style>
+          <a:lnRef idx="1">
+            <a:schemeClr val="accent1"/>
+          </a:lnRef>
+          <a:fillRef idx="0">
+            <a:schemeClr val="accent1"/>
+          </a:fillRef>
+          <a:effectRef idx="0">
+            <a:schemeClr val="accent1"/>
+          </a:effectRef>
+          <a:fontRef idx="minor">
+            <a:schemeClr val="tx1"/>
+          </a:fontRef>
+        </p:style>
+      </p:cxnSp>
+      <p:cxnSp>
+        <p:nvCxnSpPr>
+          <p:cNvPr id="51" name="Straight Arrow Connector 50"/>
+          <p:cNvCxnSpPr>
+            <a:endCxn id="30" idx="4"/>
+          </p:cNvCxnSpPr>
+          <p:nvPr/>
+        </p:nvCxnSpPr>
+        <p:spPr>
+          <a:xfrm flipV="1">
+            <a:off x="1261112" y="3204416"/>
+            <a:ext cx="0" cy="266093"/>
+          </a:xfrm>
+          <a:prstGeom prst="straightConnector1">
+            <a:avLst/>
+          </a:prstGeom>
+          <a:ln>
+            <a:tailEnd type="triangle"/>
+          </a:ln>
+        </p:spPr>
+        <p:style>
+          <a:lnRef idx="1">
+            <a:schemeClr val="accent1"/>
+          </a:lnRef>
+          <a:fillRef idx="0">
+            <a:schemeClr val="accent1"/>
+          </a:fillRef>
+          <a:effectRef idx="0">
+            <a:schemeClr val="accent1"/>
+          </a:effectRef>
+          <a:fontRef idx="minor">
+            <a:schemeClr val="tx1"/>
+          </a:fontRef>
+        </p:style>
+      </p:cxnSp>
+      <p:cxnSp>
+        <p:nvCxnSpPr>
+          <p:cNvPr id="53" name="Straight Connector 52"/>
+          <p:cNvCxnSpPr/>
+          <p:nvPr/>
+        </p:nvCxnSpPr>
+        <p:spPr>
+          <a:xfrm>
+            <a:off x="1261112" y="3470509"/>
+            <a:ext cx="1954178" cy="0"/>
+          </a:xfrm>
+          <a:prstGeom prst="line">
+            <a:avLst/>
+          </a:prstGeom>
+        </p:spPr>
+        <p:style>
+          <a:lnRef idx="1">
+            <a:schemeClr val="accent1"/>
+          </a:lnRef>
+          <a:fillRef idx="0">
+            <a:schemeClr val="accent1"/>
+          </a:fillRef>
+          <a:effectRef idx="0">
+            <a:schemeClr val="accent1"/>
+          </a:effectRef>
+          <a:fontRef idx="minor">
+            <a:schemeClr val="tx1"/>
+          </a:fontRef>
+        </p:style>
+      </p:cxnSp>
+      <p:sp>
+        <p:nvSpPr>
+          <p:cNvPr id="54" name="Rectangle 53"/>
+          <p:cNvSpPr/>
+          <p:nvPr/>
+        </p:nvSpPr>
+        <p:spPr>
+          <a:xfrm>
+            <a:off x="141607" y="3750533"/>
+            <a:ext cx="4572000" cy="2554545"/>
+          </a:xfrm>
+          <a:prstGeom prst="rect">
+            <a:avLst/>
+          </a:prstGeom>
+        </p:spPr>
+        <p:txBody>
+          <a:bodyPr>
+            <a:spAutoFit/>
+          </a:bodyPr>
+          <a:lstStyle/>
+          <a:p>
+            <a:pPr marL="285750" indent="-285750">
+              <a:buFontTx/>
+              <a:buChar char="-"/>
+            </a:pPr>
             <a:r>
               <a:rPr lang="en-AU" dirty="0" smtClean="0"/>
-              <a:t>Labelled data ranking? </a:t>
-            </a:r>
+              <a:t>We picked 22 from negative subset generated from Phase I </a:t>
+            </a:r>
+          </a:p>
+          <a:p>
+            <a:pPr marL="285750" indent="-285750">
+              <a:buFontTx/>
+              <a:buChar char="-"/>
+            </a:pPr>
+            <a:r>
+              <a:rPr lang="en-AU" dirty="0" smtClean="0"/>
+              <a:t>Build model</a:t>
+            </a:r>
+          </a:p>
+          <a:p>
+            <a:pPr marL="285750" indent="-285750">
+              <a:buFontTx/>
+              <a:buChar char="-"/>
+            </a:pPr>
+            <a:r>
+              <a:rPr lang="en-AU" dirty="0" smtClean="0"/>
+              <a:t>Predict </a:t>
+            </a:r>
+            <a:r>
+              <a:rPr lang="en-AU" dirty="0"/>
+              <a:t>full data </a:t>
+            </a:r>
+            <a:r>
+              <a:rPr lang="en-AU" dirty="0" smtClean="0"/>
+              <a:t>set</a:t>
+            </a:r>
+          </a:p>
+          <a:p>
+            <a:pPr marL="285750" indent="-285750">
+              <a:buFontTx/>
+              <a:buChar char="-"/>
+            </a:pPr>
+            <a:r>
+              <a:rPr lang="en-AU" dirty="0" smtClean="0"/>
+              <a:t>Saved </a:t>
+            </a:r>
+            <a:r>
+              <a:rPr lang="en-AU" dirty="0"/>
+              <a:t>the </a:t>
+            </a:r>
+            <a:r>
+              <a:rPr lang="en-AU" dirty="0" smtClean="0"/>
+              <a:t>result</a:t>
+            </a:r>
+          </a:p>
+          <a:p>
+            <a:pPr marL="285750" indent="-285750">
+              <a:buFontTx/>
+              <a:buChar char="-"/>
+            </a:pPr>
+            <a:r>
+              <a:rPr lang="en-AU" dirty="0" smtClean="0"/>
+              <a:t>Iterate </a:t>
+            </a:r>
+            <a:r>
+              <a:rPr lang="en-AU" dirty="0"/>
+              <a:t>the sample process 1000 </a:t>
+            </a:r>
+            <a:r>
+              <a:rPr lang="en-AU" dirty="0" smtClean="0"/>
+              <a:t>times.</a:t>
+            </a:r>
+          </a:p>
+          <a:p>
+            <a:pPr marL="285750" indent="-285750">
+              <a:buFontTx/>
+              <a:buChar char="-"/>
+            </a:pPr>
+            <a:r>
+              <a:rPr lang="en-AU" dirty="0" smtClean="0"/>
+              <a:t>Average </a:t>
+            </a:r>
+            <a:r>
+              <a:rPr lang="en-AU" dirty="0"/>
+              <a:t>the probability value. </a:t>
+            </a:r>
+            <a:endParaRPr lang="en-AU" dirty="0" smtClean="0"/>
           </a:p>
           <a:p>
             <a:endParaRPr lang="en-AU" dirty="0"/>
           </a:p>
           <a:p>
             <a:r>
+              <a:rPr lang="en-AU" sz="1600" i="1" dirty="0" err="1" smtClean="0"/>
+              <a:t>mTOR</a:t>
+            </a:r>
+            <a:r>
+              <a:rPr lang="en-AU" sz="1600" i="1" dirty="0" smtClean="0"/>
+              <a:t> negative subset threshold set up at 80% </a:t>
+            </a:r>
+            <a:endParaRPr lang="en-AU" sz="1600" i="1" dirty="0"/>
+          </a:p>
+        </p:txBody>
+      </p:sp>
+      <p:pic>
+        <p:nvPicPr>
+          <p:cNvPr id="55" name="Picture 54"/>
+          <p:cNvPicPr>
+            <a:picLocks noChangeAspect="1"/>
+          </p:cNvPicPr>
+          <p:nvPr/>
+        </p:nvPicPr>
+        <p:blipFill>
+          <a:blip r:embed="rId4"/>
+          <a:stretch>
+            <a:fillRect/>
+          </a:stretch>
+        </p:blipFill>
+        <p:spPr>
+          <a:xfrm>
+            <a:off x="4442882" y="1308103"/>
+            <a:ext cx="4445228" cy="2365172"/>
+          </a:xfrm>
+          <a:prstGeom prst="rect">
+            <a:avLst/>
+          </a:prstGeom>
+        </p:spPr>
+      </p:pic>
+      <p:sp>
+        <p:nvSpPr>
+          <p:cNvPr id="56" name="TextBox 55"/>
+          <p:cNvSpPr txBox="1"/>
+          <p:nvPr/>
+        </p:nvSpPr>
+        <p:spPr>
+          <a:xfrm>
+            <a:off x="4716379" y="1017774"/>
+            <a:ext cx="1558632" cy="369332"/>
+          </a:xfrm>
+          <a:prstGeom prst="rect">
+            <a:avLst/>
+          </a:prstGeom>
+          <a:noFill/>
+        </p:spPr>
+        <p:txBody>
+          <a:bodyPr wrap="none" rtlCol="0">
+            <a:spAutoFit/>
+          </a:bodyPr>
+          <a:lstStyle/>
+          <a:p>
+            <a:r>
               <a:rPr lang="en-AU" dirty="0" smtClean="0"/>
-              <a:t>Threshold of probability value for </a:t>
-            </a:r>
-            <a:r>
-              <a:rPr lang="en-AU" dirty="0" err="1" smtClean="0"/>
-              <a:t>mTOR</a:t>
-            </a:r>
-            <a:r>
-              <a:rPr lang="en-AU" dirty="0" smtClean="0"/>
-              <a:t>: </a:t>
-            </a:r>
-            <a:r>
-              <a:rPr lang="en-AU" dirty="0"/>
-              <a:t>??? 90% or 80%? Or do we need to consider</a:t>
-            </a:r>
-          </a:p>
-          <a:p>
-            <a:r>
-              <a:rPr lang="en-AU" dirty="0"/>
-              <a:t>Labelled data ranking? </a:t>
-            </a:r>
-            <a:endParaRPr lang="en-AU" dirty="0" smtClean="0"/>
-          </a:p>
-          <a:p>
+              <a:t>Phase II result:</a:t>
+            </a:r>
             <a:endParaRPr lang="en-AU" dirty="0"/>
           </a:p>
-          <a:p>
-            <a:r>
-              <a:rPr lang="en-AU" dirty="0" smtClean="0"/>
-              <a:t>Based on above threshold, we got ??? </a:t>
-            </a:r>
-            <a:r>
-              <a:rPr lang="en-AU" dirty="0" err="1" smtClean="0"/>
-              <a:t>Akt</a:t>
-            </a:r>
-            <a:r>
-              <a:rPr lang="en-AU" dirty="0" smtClean="0"/>
-              <a:t>, ??? </a:t>
-            </a:r>
-            <a:r>
-              <a:rPr lang="en-AU" dirty="0" err="1" smtClean="0"/>
-              <a:t>mTOR</a:t>
-            </a:r>
-            <a:endParaRPr lang="en-AU" dirty="0"/>
-          </a:p>
-          <a:p>
-            <a:endParaRPr lang="en-AU" dirty="0"/>
+        </p:txBody>
+      </p:sp>
+      <p:pic>
+        <p:nvPicPr>
+          <p:cNvPr id="57" name="Picture 56"/>
+          <p:cNvPicPr>
+            <a:picLocks noChangeAspect="1"/>
+          </p:cNvPicPr>
+          <p:nvPr/>
+        </p:nvPicPr>
+        <p:blipFill>
+          <a:blip r:embed="rId5"/>
+          <a:stretch>
+            <a:fillRect/>
+          </a:stretch>
+        </p:blipFill>
+        <p:spPr>
+          <a:xfrm>
+            <a:off x="4464996" y="3864679"/>
+            <a:ext cx="4445228" cy="2566879"/>
+          </a:xfrm>
+          <a:prstGeom prst="rect">
+            <a:avLst/>
+          </a:prstGeom>
+        </p:spPr>
+      </p:pic>
+      <p:sp>
+        <p:nvSpPr>
+          <p:cNvPr id="58" name="TextBox 57"/>
+          <p:cNvSpPr txBox="1"/>
+          <p:nvPr/>
+        </p:nvSpPr>
+        <p:spPr>
+          <a:xfrm>
+            <a:off x="2591443" y="2367006"/>
+            <a:ext cx="1177566" cy="276999"/>
+          </a:xfrm>
+          <a:prstGeom prst="rect">
+            <a:avLst/>
+          </a:prstGeom>
+          <a:noFill/>
+        </p:spPr>
+        <p:txBody>
+          <a:bodyPr wrap="none" rtlCol="0">
+            <a:spAutoFit/>
+          </a:bodyPr>
+          <a:lstStyle/>
+          <a:p>
+            <a:r>
+              <a:rPr lang="en-AU" sz="1200" dirty="0" smtClean="0"/>
+              <a:t>Negative subset</a:t>
+            </a:r>
+            <a:endParaRPr lang="en-AU" sz="1200" dirty="0"/>
           </a:p>
         </p:txBody>
       </p:sp>
     </p:spTree>
+    <p:extLst>
+      <p:ext uri="{BB962C8B-B14F-4D97-AF65-F5344CB8AC3E}">
+        <p14:creationId xmlns:p14="http://schemas.microsoft.com/office/powerpoint/2010/main" val="2119135837"/>
+      </p:ext>
+    </p:extLst>
   </p:cSld>
   <p:clrMapOvr>
     <a:masterClrMapping/>
@@ -5761,4 +8207,265 @@
     </a:ext>
   </a:extLst>
 </a:theme>
+</file>
+
+<file path=ppt/theme/theme2.xml><?xml version="1.0" encoding="utf-8"?>
+<a:theme xmlns:a="http://schemas.openxmlformats.org/drawingml/2006/main" name="Office Theme">
+  <a:themeElements>
+    <a:clrScheme name="Office">
+      <a:dk1>
+        <a:sysClr val="windowText" lastClr="000000"/>
+      </a:dk1>
+      <a:lt1>
+        <a:sysClr val="window" lastClr="FFFFFF"/>
+      </a:lt1>
+      <a:dk2>
+        <a:srgbClr val="44546A"/>
+      </a:dk2>
+      <a:lt2>
+        <a:srgbClr val="E7E6E6"/>
+      </a:lt2>
+      <a:accent1>
+        <a:srgbClr val="5B9BD5"/>
+      </a:accent1>
+      <a:accent2>
+        <a:srgbClr val="ED7D31"/>
+      </a:accent2>
+      <a:accent3>
+        <a:srgbClr val="A5A5A5"/>
+      </a:accent3>
+      <a:accent4>
+        <a:srgbClr val="FFC000"/>
+      </a:accent4>
+      <a:accent5>
+        <a:srgbClr val="4472C4"/>
+      </a:accent5>
+      <a:accent6>
+        <a:srgbClr val="70AD47"/>
+      </a:accent6>
+      <a:hlink>
+        <a:srgbClr val="0563C1"/>
+      </a:hlink>
+      <a:folHlink>
+        <a:srgbClr val="954F72"/>
+      </a:folHlink>
+    </a:clrScheme>
+    <a:fontScheme name="Office">
+      <a:majorFont>
+        <a:latin typeface="Calibri Light" panose="020F0302020204030204"/>
+        <a:ea typeface=""/>
+        <a:cs typeface=""/>
+        <a:font script="Jpan" typeface="ＭＳ Ｐゴシック"/>
+        <a:font script="Hang" typeface="맑은 고딕"/>
+        <a:font script="Hans" typeface="宋体"/>
+        <a:font script="Hant" typeface="新細明體"/>
+        <a:font script="Arab" typeface="Times New Roman"/>
+        <a:font script="Hebr" typeface="Times New Roman"/>
+        <a:font script="Thai" typeface="Angsana New"/>
+        <a:font script="Ethi" typeface="Nyala"/>
+        <a:font script="Beng" typeface="Vrinda"/>
+        <a:font script="Gujr" typeface="Shruti"/>
+        <a:font script="Khmr" typeface="MoolBoran"/>
+        <a:font script="Knda" typeface="Tunga"/>
+        <a:font script="Guru" typeface="Raavi"/>
+        <a:font script="Cans" typeface="Euphemia"/>
+        <a:font script="Cher" typeface="Plantagenet Cherokee"/>
+        <a:font script="Yiii" typeface="Microsoft Yi Baiti"/>
+        <a:font script="Tibt" typeface="Microsoft Himalaya"/>
+        <a:font script="Thaa" typeface="MV Boli"/>
+        <a:font script="Deva" typeface="Mangal"/>
+        <a:font script="Telu" typeface="Gautami"/>
+        <a:font script="Taml" typeface="Latha"/>
+        <a:font script="Syrc" typeface="Estrangelo Edessa"/>
+        <a:font script="Orya" typeface="Kalinga"/>
+        <a:font script="Mlym" typeface="Kartika"/>
+        <a:font script="Laoo" typeface="DokChampa"/>
+        <a:font script="Sinh" typeface="Iskoola Pota"/>
+        <a:font script="Mong" typeface="Mongolian Baiti"/>
+        <a:font script="Viet" typeface="Times New Roman"/>
+        <a:font script="Uigh" typeface="Microsoft Uighur"/>
+        <a:font script="Geor" typeface="Sylfaen"/>
+      </a:majorFont>
+      <a:minorFont>
+        <a:latin typeface="Calibri" panose="020F0502020204030204"/>
+        <a:ea typeface=""/>
+        <a:cs typeface=""/>
+        <a:font script="Jpan" typeface="ＭＳ Ｐゴシック"/>
+        <a:font script="Hang" typeface="맑은 고딕"/>
+        <a:font script="Hans" typeface="宋体"/>
+        <a:font script="Hant" typeface="新細明體"/>
+        <a:font script="Arab" typeface="Arial"/>
+        <a:font script="Hebr" typeface="Arial"/>
+        <a:font script="Thai" typeface="Cordia New"/>
+        <a:font script="Ethi" typeface="Nyala"/>
+        <a:font script="Beng" typeface="Vrinda"/>
+        <a:font script="Gujr" typeface="Shruti"/>
+        <a:font script="Khmr" typeface="DaunPenh"/>
+        <a:font script="Knda" typeface="Tunga"/>
+        <a:font script="Guru" typeface="Raavi"/>
+        <a:font script="Cans" typeface="Euphemia"/>
+        <a:font script="Cher" typeface="Plantagenet Cherokee"/>
+        <a:font script="Yiii" typeface="Microsoft Yi Baiti"/>
+        <a:font script="Tibt" typeface="Microsoft Himalaya"/>
+        <a:font script="Thaa" typeface="MV Boli"/>
+        <a:font script="Deva" typeface="Mangal"/>
+        <a:font script="Telu" typeface="Gautami"/>
+        <a:font script="Taml" typeface="Latha"/>
+        <a:font script="Syrc" typeface="Estrangelo Edessa"/>
+        <a:font script="Orya" typeface="Kalinga"/>
+        <a:font script="Mlym" typeface="Kartika"/>
+        <a:font script="Laoo" typeface="DokChampa"/>
+        <a:font script="Sinh" typeface="Iskoola Pota"/>
+        <a:font script="Mong" typeface="Mongolian Baiti"/>
+        <a:font script="Viet" typeface="Arial"/>
+        <a:font script="Uigh" typeface="Microsoft Uighur"/>
+        <a:font script="Geor" typeface="Sylfaen"/>
+      </a:minorFont>
+    </a:fontScheme>
+    <a:fmtScheme name="Office">
+      <a:fillStyleLst>
+        <a:solidFill>
+          <a:schemeClr val="phClr"/>
+        </a:solidFill>
+        <a:gradFill rotWithShape="1">
+          <a:gsLst>
+            <a:gs pos="0">
+              <a:schemeClr val="phClr">
+                <a:lumMod val="110000"/>
+                <a:satMod val="105000"/>
+                <a:tint val="67000"/>
+              </a:schemeClr>
+            </a:gs>
+            <a:gs pos="50000">
+              <a:schemeClr val="phClr">
+                <a:lumMod val="105000"/>
+                <a:satMod val="103000"/>
+                <a:tint val="73000"/>
+              </a:schemeClr>
+            </a:gs>
+            <a:gs pos="100000">
+              <a:schemeClr val="phClr">
+                <a:lumMod val="105000"/>
+                <a:satMod val="109000"/>
+                <a:tint val="81000"/>
+              </a:schemeClr>
+            </a:gs>
+          </a:gsLst>
+          <a:lin ang="5400000" scaled="0"/>
+        </a:gradFill>
+        <a:gradFill rotWithShape="1">
+          <a:gsLst>
+            <a:gs pos="0">
+              <a:schemeClr val="phClr">
+                <a:satMod val="103000"/>
+                <a:lumMod val="102000"/>
+                <a:tint val="94000"/>
+              </a:schemeClr>
+            </a:gs>
+            <a:gs pos="50000">
+              <a:schemeClr val="phClr">
+                <a:satMod val="110000"/>
+                <a:lumMod val="100000"/>
+                <a:shade val="100000"/>
+              </a:schemeClr>
+            </a:gs>
+            <a:gs pos="100000">
+              <a:schemeClr val="phClr">
+                <a:lumMod val="99000"/>
+                <a:satMod val="120000"/>
+                <a:shade val="78000"/>
+              </a:schemeClr>
+            </a:gs>
+          </a:gsLst>
+          <a:lin ang="5400000" scaled="0"/>
+        </a:gradFill>
+      </a:fillStyleLst>
+      <a:lnStyleLst>
+        <a:ln w="6350" cap="flat" cmpd="sng" algn="ctr">
+          <a:solidFill>
+            <a:schemeClr val="phClr"/>
+          </a:solidFill>
+          <a:prstDash val="solid"/>
+          <a:miter lim="800000"/>
+        </a:ln>
+        <a:ln w="12700" cap="flat" cmpd="sng" algn="ctr">
+          <a:solidFill>
+            <a:schemeClr val="phClr"/>
+          </a:solidFill>
+          <a:prstDash val="solid"/>
+          <a:miter lim="800000"/>
+        </a:ln>
+        <a:ln w="19050" cap="flat" cmpd="sng" algn="ctr">
+          <a:solidFill>
+            <a:schemeClr val="phClr"/>
+          </a:solidFill>
+          <a:prstDash val="solid"/>
+          <a:miter lim="800000"/>
+        </a:ln>
+      </a:lnStyleLst>
+      <a:effectStyleLst>
+        <a:effectStyle>
+          <a:effectLst/>
+        </a:effectStyle>
+        <a:effectStyle>
+          <a:effectLst/>
+        </a:effectStyle>
+        <a:effectStyle>
+          <a:effectLst>
+            <a:outerShdw blurRad="57150" dist="19050" dir="5400000" algn="ctr" rotWithShape="0">
+              <a:srgbClr val="000000">
+                <a:alpha val="63000"/>
+              </a:srgbClr>
+            </a:outerShdw>
+          </a:effectLst>
+        </a:effectStyle>
+      </a:effectStyleLst>
+      <a:bgFillStyleLst>
+        <a:solidFill>
+          <a:schemeClr val="phClr"/>
+        </a:solidFill>
+        <a:solidFill>
+          <a:schemeClr val="phClr">
+            <a:tint val="95000"/>
+            <a:satMod val="170000"/>
+          </a:schemeClr>
+        </a:solidFill>
+        <a:gradFill rotWithShape="1">
+          <a:gsLst>
+            <a:gs pos="0">
+              <a:schemeClr val="phClr">
+                <a:tint val="93000"/>
+                <a:satMod val="150000"/>
+                <a:shade val="98000"/>
+                <a:lumMod val="102000"/>
+              </a:schemeClr>
+            </a:gs>
+            <a:gs pos="50000">
+              <a:schemeClr val="phClr">
+                <a:tint val="98000"/>
+                <a:satMod val="130000"/>
+                <a:shade val="90000"/>
+                <a:lumMod val="103000"/>
+              </a:schemeClr>
+            </a:gs>
+            <a:gs pos="100000">
+              <a:schemeClr val="phClr">
+                <a:shade val="63000"/>
+                <a:satMod val="120000"/>
+              </a:schemeClr>
+            </a:gs>
+          </a:gsLst>
+          <a:lin ang="5400000" scaled="0"/>
+        </a:gradFill>
+      </a:bgFillStyleLst>
+    </a:fmtScheme>
+  </a:themeElements>
+  <a:objectDefaults/>
+  <a:extraClrSchemeLst/>
+  <a:extLst>
+    <a:ext uri="{05A4C25C-085E-4340-85A3-A5531E510DB2}">
+      <thm15:themeFamily xmlns:thm15="http://schemas.microsoft.com/office/thememl/2012/main" name="Office Theme" id="{62F939B6-93AF-4DB8-9C6B-D6C7DFDC589F}" vid="{4A3C46E8-61CC-4603-A589-7422A47A8E4A}"/>
+    </a:ext>
+  </a:extLst>
+</a:theme>
 </file>
</xml_diff>